<commit_message>
ndc session 1 complete
</commit_message>
<xml_diff>
--- a/angular2/slides/04_Services_DI.pptx
+++ b/angular2/slides/04_Services_DI.pptx
@@ -1993,6 +1993,13 @@
         </dgm:presLayoutVars>
       </dgm:prSet>
       <dgm:spPr/>
+      <dgm:t>
+        <a:bodyPr/>
+        <a:lstStyle/>
+        <a:p>
+          <a:endParaRPr lang="en-US"/>
+        </a:p>
+      </dgm:t>
     </dgm:pt>
     <dgm:pt modelId="{36FC6E05-4100-4145-9EBC-BA82AA18A8E6}" type="pres">
       <dgm:prSet presAssocID="{51FC4258-6D06-494F-91D0-050FBAAE2821}" presName="hierRoot1" presStyleCnt="0">
@@ -2024,6 +2031,13 @@
     <dgm:pt modelId="{6FA1F303-F81F-4086-8CA8-C5C45FB8D5DD}" type="pres">
       <dgm:prSet presAssocID="{51FC4258-6D06-494F-91D0-050FBAAE2821}" presName="rootConnector1" presStyleLbl="node1" presStyleIdx="0" presStyleCnt="0"/>
       <dgm:spPr/>
+      <dgm:t>
+        <a:bodyPr/>
+        <a:lstStyle/>
+        <a:p>
+          <a:endParaRPr lang="en-US"/>
+        </a:p>
+      </dgm:t>
     </dgm:pt>
     <dgm:pt modelId="{78F136E0-DE43-40A1-B592-CB0AF99F9F28}" type="pres">
       <dgm:prSet presAssocID="{51FC4258-6D06-494F-91D0-050FBAAE2821}" presName="hierChild2" presStyleCnt="0"/>
@@ -2032,6 +2046,13 @@
     <dgm:pt modelId="{37C0986C-7A4F-4D80-AB86-E1DF3A130412}" type="pres">
       <dgm:prSet presAssocID="{41620FA9-438D-479B-BE8A-9241C7529B97}" presName="Name37" presStyleLbl="parChTrans1D2" presStyleIdx="0" presStyleCnt="4"/>
       <dgm:spPr/>
+      <dgm:t>
+        <a:bodyPr/>
+        <a:lstStyle/>
+        <a:p>
+          <a:endParaRPr lang="en-US"/>
+        </a:p>
+      </dgm:t>
     </dgm:pt>
     <dgm:pt modelId="{6CF9FFE0-BE7E-488C-BB81-3BA7137E5440}" type="pres">
       <dgm:prSet presAssocID="{2B794F19-BBB4-40AE-8A02-005AF312B0CB}" presName="hierRoot2" presStyleCnt="0">
@@ -2052,10 +2073,24 @@
         </dgm:presLayoutVars>
       </dgm:prSet>
       <dgm:spPr/>
+      <dgm:t>
+        <a:bodyPr/>
+        <a:lstStyle/>
+        <a:p>
+          <a:endParaRPr lang="en-US"/>
+        </a:p>
+      </dgm:t>
     </dgm:pt>
     <dgm:pt modelId="{AB3EBC11-6228-41FC-943A-1EC28CAE4BCA}" type="pres">
       <dgm:prSet presAssocID="{2B794F19-BBB4-40AE-8A02-005AF312B0CB}" presName="rootConnector" presStyleLbl="node2" presStyleIdx="0" presStyleCnt="3"/>
       <dgm:spPr/>
+      <dgm:t>
+        <a:bodyPr/>
+        <a:lstStyle/>
+        <a:p>
+          <a:endParaRPr lang="en-US"/>
+        </a:p>
+      </dgm:t>
     </dgm:pt>
     <dgm:pt modelId="{807D1FE8-677B-4E1F-869C-90F9C79A9587}" type="pres">
       <dgm:prSet presAssocID="{2B794F19-BBB4-40AE-8A02-005AF312B0CB}" presName="hierChild4" presStyleCnt="0"/>
@@ -2068,6 +2103,13 @@
     <dgm:pt modelId="{3C78C002-1AC3-41B3-89E0-321DB83FE365}" type="pres">
       <dgm:prSet presAssocID="{EF65000C-2AD1-426C-8C60-A38915C1E6A8}" presName="Name37" presStyleLbl="parChTrans1D2" presStyleIdx="1" presStyleCnt="4"/>
       <dgm:spPr/>
+      <dgm:t>
+        <a:bodyPr/>
+        <a:lstStyle/>
+        <a:p>
+          <a:endParaRPr lang="en-US"/>
+        </a:p>
+      </dgm:t>
     </dgm:pt>
     <dgm:pt modelId="{9468FDEC-55F6-4ECB-9D75-FE69280A6BCA}" type="pres">
       <dgm:prSet presAssocID="{E4646C87-1D5C-488E-A15A-8E32408C91C9}" presName="hierRoot2" presStyleCnt="0">
@@ -2099,6 +2141,13 @@
     <dgm:pt modelId="{CA4D75A4-41AD-41F7-B038-EA4733BE9432}" type="pres">
       <dgm:prSet presAssocID="{E4646C87-1D5C-488E-A15A-8E32408C91C9}" presName="rootConnector" presStyleLbl="node2" presStyleIdx="1" presStyleCnt="3"/>
       <dgm:spPr/>
+      <dgm:t>
+        <a:bodyPr/>
+        <a:lstStyle/>
+        <a:p>
+          <a:endParaRPr lang="en-US"/>
+        </a:p>
+      </dgm:t>
     </dgm:pt>
     <dgm:pt modelId="{EB7AEF75-88E0-4B58-AD3A-2FBD1DF82811}" type="pres">
       <dgm:prSet presAssocID="{E4646C87-1D5C-488E-A15A-8E32408C91C9}" presName="hierChild4" presStyleCnt="0"/>
@@ -2111,6 +2160,13 @@
     <dgm:pt modelId="{BB82E3A6-21E2-4321-BBF7-995CFA742628}" type="pres">
       <dgm:prSet presAssocID="{59F28D88-5C53-4A09-BB17-FC7F6B8F9ABA}" presName="Name37" presStyleLbl="parChTrans1D2" presStyleIdx="2" presStyleCnt="4"/>
       <dgm:spPr/>
+      <dgm:t>
+        <a:bodyPr/>
+        <a:lstStyle/>
+        <a:p>
+          <a:endParaRPr lang="en-US"/>
+        </a:p>
+      </dgm:t>
     </dgm:pt>
     <dgm:pt modelId="{7CA2D5D9-322B-47A2-9010-DF439DDB86BA}" type="pres">
       <dgm:prSet presAssocID="{1A9BF837-6F58-443B-A2EA-CC9579FF8901}" presName="hierRoot2" presStyleCnt="0">
@@ -2131,10 +2187,24 @@
         </dgm:presLayoutVars>
       </dgm:prSet>
       <dgm:spPr/>
+      <dgm:t>
+        <a:bodyPr/>
+        <a:lstStyle/>
+        <a:p>
+          <a:endParaRPr lang="en-US"/>
+        </a:p>
+      </dgm:t>
     </dgm:pt>
     <dgm:pt modelId="{3E5BD639-6EFF-4F6A-B5BA-0A2013892613}" type="pres">
       <dgm:prSet presAssocID="{1A9BF837-6F58-443B-A2EA-CC9579FF8901}" presName="rootConnector" presStyleLbl="node2" presStyleIdx="2" presStyleCnt="3"/>
       <dgm:spPr/>
+      <dgm:t>
+        <a:bodyPr/>
+        <a:lstStyle/>
+        <a:p>
+          <a:endParaRPr lang="en-US"/>
+        </a:p>
+      </dgm:t>
     </dgm:pt>
     <dgm:pt modelId="{166A732C-4C91-427C-824F-C19DEE09FF16}" type="pres">
       <dgm:prSet presAssocID="{1A9BF837-6F58-443B-A2EA-CC9579FF8901}" presName="hierChild4" presStyleCnt="0"/>
@@ -2151,6 +2221,13 @@
     <dgm:pt modelId="{9724640F-F9F2-4781-89B9-B9EB9C9883A2}" type="pres">
       <dgm:prSet presAssocID="{FFA7DDD0-7E6D-485C-873E-08BCDFCE6512}" presName="Name111" presStyleLbl="parChTrans1D2" presStyleIdx="3" presStyleCnt="4"/>
       <dgm:spPr/>
+      <dgm:t>
+        <a:bodyPr/>
+        <a:lstStyle/>
+        <a:p>
+          <a:endParaRPr lang="en-US"/>
+        </a:p>
+      </dgm:t>
     </dgm:pt>
     <dgm:pt modelId="{D7D7D683-A84D-4429-A621-06136D7EDA8A}" type="pres">
       <dgm:prSet presAssocID="{244EE17A-B3F9-495B-9E01-C01B9352C2A0}" presName="hierRoot3" presStyleCnt="0">
@@ -2182,6 +2259,13 @@
     <dgm:pt modelId="{9E1EFAB8-8D76-4115-B92A-45E6DD4E5EA6}" type="pres">
       <dgm:prSet presAssocID="{244EE17A-B3F9-495B-9E01-C01B9352C2A0}" presName="rootConnector3" presStyleLbl="asst1" presStyleIdx="0" presStyleCnt="1"/>
       <dgm:spPr/>
+      <dgm:t>
+        <a:bodyPr/>
+        <a:lstStyle/>
+        <a:p>
+          <a:endParaRPr lang="en-US"/>
+        </a:p>
+      </dgm:t>
     </dgm:pt>
     <dgm:pt modelId="{9FF3F31F-7C0B-4E24-9973-50710D005F1E}" type="pres">
       <dgm:prSet presAssocID="{244EE17A-B3F9-495B-9E01-C01B9352C2A0}" presName="hierChild6" presStyleCnt="0"/>
@@ -2194,25 +2278,25 @@
   </dgm:ptLst>
   <dgm:cxnLst>
     <dgm:cxn modelId="{1506DDD0-FE47-4C18-99A3-D50C1C8BE83A}" type="presOf" srcId="{E4646C87-1D5C-488E-A15A-8E32408C91C9}" destId="{CA4D75A4-41AD-41F7-B038-EA4733BE9432}" srcOrd="1" destOrd="0" presId="urn:microsoft.com/office/officeart/2005/8/layout/orgChart1"/>
+    <dgm:cxn modelId="{00A879CC-487A-4113-8BCA-4E49794933AC}" type="presOf" srcId="{1A9BF837-6F58-443B-A2EA-CC9579FF8901}" destId="{3E5BD639-6EFF-4F6A-B5BA-0A2013892613}" srcOrd="1" destOrd="0" presId="urn:microsoft.com/office/officeart/2005/8/layout/orgChart1"/>
+    <dgm:cxn modelId="{6640B9E6-3C1A-43B6-8E07-9E83EEAB3886}" type="presOf" srcId="{51FC4258-6D06-494F-91D0-050FBAAE2821}" destId="{6FA1F303-F81F-4086-8CA8-C5C45FB8D5DD}" srcOrd="1" destOrd="0" presId="urn:microsoft.com/office/officeart/2005/8/layout/orgChart1"/>
+    <dgm:cxn modelId="{223D2CEC-40FF-4DD7-A063-4C769A744038}" type="presOf" srcId="{41620FA9-438D-479B-BE8A-9241C7529B97}" destId="{37C0986C-7A4F-4D80-AB86-E1DF3A130412}" srcOrd="0" destOrd="0" presId="urn:microsoft.com/office/officeart/2005/8/layout/orgChart1"/>
+    <dgm:cxn modelId="{AF86FFA2-6D0D-4082-B031-0D7D5A3641A5}" srcId="{2992D994-0831-4186-B42F-5FB754E9E498}" destId="{51FC4258-6D06-494F-91D0-050FBAAE2821}" srcOrd="0" destOrd="0" parTransId="{4AB7D006-6848-4F84-BCDF-1001AC17D8D8}" sibTransId="{FB4ECDA2-7274-4EFD-B8B0-CA6429DFB7D0}"/>
+    <dgm:cxn modelId="{BB8B446D-9169-4195-8054-616EFF64B965}" srcId="{51FC4258-6D06-494F-91D0-050FBAAE2821}" destId="{1A9BF837-6F58-443B-A2EA-CC9579FF8901}" srcOrd="3" destOrd="0" parTransId="{59F28D88-5C53-4A09-BB17-FC7F6B8F9ABA}" sibTransId="{4C0DBC71-5E47-41D3-B719-23AD97A05620}"/>
+    <dgm:cxn modelId="{1DA36077-703A-44E9-BF10-60D0DC4D5031}" type="presOf" srcId="{2992D994-0831-4186-B42F-5FB754E9E498}" destId="{73D38206-EB39-40CF-9A3B-551DBA203F41}" srcOrd="0" destOrd="0" presId="urn:microsoft.com/office/officeart/2005/8/layout/orgChart1"/>
+    <dgm:cxn modelId="{740756A3-00C1-4F4A-B6DC-E37C718AF4B0}" type="presOf" srcId="{FFA7DDD0-7E6D-485C-873E-08BCDFCE6512}" destId="{9724640F-F9F2-4781-89B9-B9EB9C9883A2}" srcOrd="0" destOrd="0" presId="urn:microsoft.com/office/officeart/2005/8/layout/orgChart1"/>
+    <dgm:cxn modelId="{0440CD5E-AB5C-44DA-9233-1D76214DE653}" srcId="{51FC4258-6D06-494F-91D0-050FBAAE2821}" destId="{2B794F19-BBB4-40AE-8A02-005AF312B0CB}" srcOrd="1" destOrd="0" parTransId="{41620FA9-438D-479B-BE8A-9241C7529B97}" sibTransId="{BF6DB499-D8FD-4434-9E19-42D8981326F4}"/>
     <dgm:cxn modelId="{FF362330-928F-4AD5-8D95-E2408ECDD2FD}" type="presOf" srcId="{E4646C87-1D5C-488E-A15A-8E32408C91C9}" destId="{EC0D1E2C-77F3-46FF-84D8-9F34BF30D0DB}" srcOrd="0" destOrd="0" presId="urn:microsoft.com/office/officeart/2005/8/layout/orgChart1"/>
+    <dgm:cxn modelId="{F2942F07-8925-4CC9-90C0-46A11CF03B7A}" type="presOf" srcId="{59F28D88-5C53-4A09-BB17-FC7F6B8F9ABA}" destId="{BB82E3A6-21E2-4321-BBF7-995CFA742628}" srcOrd="0" destOrd="0" presId="urn:microsoft.com/office/officeart/2005/8/layout/orgChart1"/>
+    <dgm:cxn modelId="{73404C83-17E3-490D-8B5A-DE6F145D35E0}" type="presOf" srcId="{244EE17A-B3F9-495B-9E01-C01B9352C2A0}" destId="{9E1EFAB8-8D76-4115-B92A-45E6DD4E5EA6}" srcOrd="1" destOrd="0" presId="urn:microsoft.com/office/officeart/2005/8/layout/orgChart1"/>
+    <dgm:cxn modelId="{8FA46886-A422-478F-8953-572A60995862}" type="presOf" srcId="{2B794F19-BBB4-40AE-8A02-005AF312B0CB}" destId="{234A27DB-36A9-4447-A301-7454150C07B6}" srcOrd="0" destOrd="0" presId="urn:microsoft.com/office/officeart/2005/8/layout/orgChart1"/>
+    <dgm:cxn modelId="{C12E1252-CDA1-4826-8241-678061B2BE29}" type="presOf" srcId="{EF65000C-2AD1-426C-8C60-A38915C1E6A8}" destId="{3C78C002-1AC3-41B3-89E0-321DB83FE365}" srcOrd="0" destOrd="0" presId="urn:microsoft.com/office/officeart/2005/8/layout/orgChart1"/>
     <dgm:cxn modelId="{90919E10-F34D-4839-9C2D-F453539D88F8}" type="presOf" srcId="{244EE17A-B3F9-495B-9E01-C01B9352C2A0}" destId="{809594D5-42AB-48C3-B007-ED5329F84148}" srcOrd="0" destOrd="0" presId="urn:microsoft.com/office/officeart/2005/8/layout/orgChart1"/>
-    <dgm:cxn modelId="{8FA46886-A422-478F-8953-572A60995862}" type="presOf" srcId="{2B794F19-BBB4-40AE-8A02-005AF312B0CB}" destId="{234A27DB-36A9-4447-A301-7454150C07B6}" srcOrd="0" destOrd="0" presId="urn:microsoft.com/office/officeart/2005/8/layout/orgChart1"/>
+    <dgm:cxn modelId="{52D74390-1A9B-4077-AB3F-5541CBC92BF6}" type="presOf" srcId="{51FC4258-6D06-494F-91D0-050FBAAE2821}" destId="{60FACEAF-2A4B-4F0B-BCDC-B97101F53B65}" srcOrd="0" destOrd="0" presId="urn:microsoft.com/office/officeart/2005/8/layout/orgChart1"/>
+    <dgm:cxn modelId="{CA58696D-1268-4EA4-A96D-79E746BCCEFB}" srcId="{51FC4258-6D06-494F-91D0-050FBAAE2821}" destId="{E4646C87-1D5C-488E-A15A-8E32408C91C9}" srcOrd="2" destOrd="0" parTransId="{EF65000C-2AD1-426C-8C60-A38915C1E6A8}" sibTransId="{38942D74-3F53-47FA-880A-D4A116972DB2}"/>
     <dgm:cxn modelId="{74677EB2-B0AA-4675-B661-AFE8C12DEB18}" type="presOf" srcId="{2B794F19-BBB4-40AE-8A02-005AF312B0CB}" destId="{AB3EBC11-6228-41FC-943A-1EC28CAE4BCA}" srcOrd="1" destOrd="0" presId="urn:microsoft.com/office/officeart/2005/8/layout/orgChart1"/>
-    <dgm:cxn modelId="{CA58696D-1268-4EA4-A96D-79E746BCCEFB}" srcId="{51FC4258-6D06-494F-91D0-050FBAAE2821}" destId="{E4646C87-1D5C-488E-A15A-8E32408C91C9}" srcOrd="2" destOrd="0" parTransId="{EF65000C-2AD1-426C-8C60-A38915C1E6A8}" sibTransId="{38942D74-3F53-47FA-880A-D4A116972DB2}"/>
-    <dgm:cxn modelId="{F2942F07-8925-4CC9-90C0-46A11CF03B7A}" type="presOf" srcId="{59F28D88-5C53-4A09-BB17-FC7F6B8F9ABA}" destId="{BB82E3A6-21E2-4321-BBF7-995CFA742628}" srcOrd="0" destOrd="0" presId="urn:microsoft.com/office/officeart/2005/8/layout/orgChart1"/>
-    <dgm:cxn modelId="{52D74390-1A9B-4077-AB3F-5541CBC92BF6}" type="presOf" srcId="{51FC4258-6D06-494F-91D0-050FBAAE2821}" destId="{60FACEAF-2A4B-4F0B-BCDC-B97101F53B65}" srcOrd="0" destOrd="0" presId="urn:microsoft.com/office/officeart/2005/8/layout/orgChart1"/>
-    <dgm:cxn modelId="{223D2CEC-40FF-4DD7-A063-4C769A744038}" type="presOf" srcId="{41620FA9-438D-479B-BE8A-9241C7529B97}" destId="{37C0986C-7A4F-4D80-AB86-E1DF3A130412}" srcOrd="0" destOrd="0" presId="urn:microsoft.com/office/officeart/2005/8/layout/orgChart1"/>
-    <dgm:cxn modelId="{BB8B446D-9169-4195-8054-616EFF64B965}" srcId="{51FC4258-6D06-494F-91D0-050FBAAE2821}" destId="{1A9BF837-6F58-443B-A2EA-CC9579FF8901}" srcOrd="3" destOrd="0" parTransId="{59F28D88-5C53-4A09-BB17-FC7F6B8F9ABA}" sibTransId="{4C0DBC71-5E47-41D3-B719-23AD97A05620}"/>
-    <dgm:cxn modelId="{AF86FFA2-6D0D-4082-B031-0D7D5A3641A5}" srcId="{2992D994-0831-4186-B42F-5FB754E9E498}" destId="{51FC4258-6D06-494F-91D0-050FBAAE2821}" srcOrd="0" destOrd="0" parTransId="{4AB7D006-6848-4F84-BCDF-1001AC17D8D8}" sibTransId="{FB4ECDA2-7274-4EFD-B8B0-CA6429DFB7D0}"/>
-    <dgm:cxn modelId="{6640B9E6-3C1A-43B6-8E07-9E83EEAB3886}" type="presOf" srcId="{51FC4258-6D06-494F-91D0-050FBAAE2821}" destId="{6FA1F303-F81F-4086-8CA8-C5C45FB8D5DD}" srcOrd="1" destOrd="0" presId="urn:microsoft.com/office/officeart/2005/8/layout/orgChart1"/>
-    <dgm:cxn modelId="{0440CD5E-AB5C-44DA-9233-1D76214DE653}" srcId="{51FC4258-6D06-494F-91D0-050FBAAE2821}" destId="{2B794F19-BBB4-40AE-8A02-005AF312B0CB}" srcOrd="1" destOrd="0" parTransId="{41620FA9-438D-479B-BE8A-9241C7529B97}" sibTransId="{BF6DB499-D8FD-4434-9E19-42D8981326F4}"/>
     <dgm:cxn modelId="{DA751E37-56AC-424D-BBF4-BB82EA01757C}" type="presOf" srcId="{1A9BF837-6F58-443B-A2EA-CC9579FF8901}" destId="{99995B44-FB4D-4521-895D-42A906C789F2}" srcOrd="0" destOrd="0" presId="urn:microsoft.com/office/officeart/2005/8/layout/orgChart1"/>
-    <dgm:cxn modelId="{740756A3-00C1-4F4A-B6DC-E37C718AF4B0}" type="presOf" srcId="{FFA7DDD0-7E6D-485C-873E-08BCDFCE6512}" destId="{9724640F-F9F2-4781-89B9-B9EB9C9883A2}" srcOrd="0" destOrd="0" presId="urn:microsoft.com/office/officeart/2005/8/layout/orgChart1"/>
     <dgm:cxn modelId="{B5BDA5E3-E00F-4CC9-A2D2-6B1D5A6BE670}" srcId="{51FC4258-6D06-494F-91D0-050FBAAE2821}" destId="{244EE17A-B3F9-495B-9E01-C01B9352C2A0}" srcOrd="0" destOrd="0" parTransId="{FFA7DDD0-7E6D-485C-873E-08BCDFCE6512}" sibTransId="{CFC50FDF-712E-46A8-9E0E-4B21AB91301D}"/>
-    <dgm:cxn modelId="{C12E1252-CDA1-4826-8241-678061B2BE29}" type="presOf" srcId="{EF65000C-2AD1-426C-8C60-A38915C1E6A8}" destId="{3C78C002-1AC3-41B3-89E0-321DB83FE365}" srcOrd="0" destOrd="0" presId="urn:microsoft.com/office/officeart/2005/8/layout/orgChart1"/>
-    <dgm:cxn modelId="{73404C83-17E3-490D-8B5A-DE6F145D35E0}" type="presOf" srcId="{244EE17A-B3F9-495B-9E01-C01B9352C2A0}" destId="{9E1EFAB8-8D76-4115-B92A-45E6DD4E5EA6}" srcOrd="1" destOrd="0" presId="urn:microsoft.com/office/officeart/2005/8/layout/orgChart1"/>
-    <dgm:cxn modelId="{1DA36077-703A-44E9-BF10-60D0DC4D5031}" type="presOf" srcId="{2992D994-0831-4186-B42F-5FB754E9E498}" destId="{73D38206-EB39-40CF-9A3B-551DBA203F41}" srcOrd="0" destOrd="0" presId="urn:microsoft.com/office/officeart/2005/8/layout/orgChart1"/>
-    <dgm:cxn modelId="{00A879CC-487A-4113-8BCA-4E49794933AC}" type="presOf" srcId="{1A9BF837-6F58-443B-A2EA-CC9579FF8901}" destId="{3E5BD639-6EFF-4F6A-B5BA-0A2013892613}" srcOrd="1" destOrd="0" presId="urn:microsoft.com/office/officeart/2005/8/layout/orgChart1"/>
     <dgm:cxn modelId="{9CD69AAE-8A0F-40AE-B1A3-27910EB92D28}" type="presParOf" srcId="{73D38206-EB39-40CF-9A3B-551DBA203F41}" destId="{36FC6E05-4100-4145-9EBC-BA82AA18A8E6}" srcOrd="0" destOrd="0" presId="urn:microsoft.com/office/officeart/2005/8/layout/orgChart1"/>
     <dgm:cxn modelId="{4FC588D0-6593-445A-8199-5E39F0B25DF6}" type="presParOf" srcId="{36FC6E05-4100-4145-9EBC-BA82AA18A8E6}" destId="{AA56CCD4-AD31-4915-B8AB-19DBF64E4A44}" srcOrd="0" destOrd="0" presId="urn:microsoft.com/office/officeart/2005/8/layout/orgChart1"/>
     <dgm:cxn modelId="{F17391C9-2C69-47C8-B42D-1F920E8F3447}" type="presParOf" srcId="{AA56CCD4-AD31-4915-B8AB-19DBF64E4A44}" destId="{60FACEAF-2A4B-4F0B-BCDC-B97101F53B65}" srcOrd="0" destOrd="0" presId="urn:microsoft.com/office/officeart/2005/8/layout/orgChart1"/>
@@ -2567,6 +2651,13 @@
         </dgm:presLayoutVars>
       </dgm:prSet>
       <dgm:spPr/>
+      <dgm:t>
+        <a:bodyPr/>
+        <a:lstStyle/>
+        <a:p>
+          <a:endParaRPr lang="en-US"/>
+        </a:p>
+      </dgm:t>
     </dgm:pt>
     <dgm:pt modelId="{36FC6E05-4100-4145-9EBC-BA82AA18A8E6}" type="pres">
       <dgm:prSet presAssocID="{51FC4258-6D06-494F-91D0-050FBAAE2821}" presName="hierRoot1" presStyleCnt="0">
@@ -2598,6 +2689,13 @@
     <dgm:pt modelId="{6FA1F303-F81F-4086-8CA8-C5C45FB8D5DD}" type="pres">
       <dgm:prSet presAssocID="{51FC4258-6D06-494F-91D0-050FBAAE2821}" presName="rootConnector1" presStyleLbl="node1" presStyleIdx="0" presStyleCnt="0"/>
       <dgm:spPr/>
+      <dgm:t>
+        <a:bodyPr/>
+        <a:lstStyle/>
+        <a:p>
+          <a:endParaRPr lang="en-US"/>
+        </a:p>
+      </dgm:t>
     </dgm:pt>
     <dgm:pt modelId="{78F136E0-DE43-40A1-B592-CB0AF99F9F28}" type="pres">
       <dgm:prSet presAssocID="{51FC4258-6D06-494F-91D0-050FBAAE2821}" presName="hierChild2" presStyleCnt="0"/>
@@ -2606,6 +2704,13 @@
     <dgm:pt modelId="{37C0986C-7A4F-4D80-AB86-E1DF3A130412}" type="pres">
       <dgm:prSet presAssocID="{41620FA9-438D-479B-BE8A-9241C7529B97}" presName="Name37" presStyleLbl="parChTrans1D2" presStyleIdx="0" presStyleCnt="4"/>
       <dgm:spPr/>
+      <dgm:t>
+        <a:bodyPr/>
+        <a:lstStyle/>
+        <a:p>
+          <a:endParaRPr lang="en-US"/>
+        </a:p>
+      </dgm:t>
     </dgm:pt>
     <dgm:pt modelId="{6CF9FFE0-BE7E-488C-BB81-3BA7137E5440}" type="pres">
       <dgm:prSet presAssocID="{2B794F19-BBB4-40AE-8A02-005AF312B0CB}" presName="hierRoot2" presStyleCnt="0">
@@ -2626,10 +2731,24 @@
         </dgm:presLayoutVars>
       </dgm:prSet>
       <dgm:spPr/>
+      <dgm:t>
+        <a:bodyPr/>
+        <a:lstStyle/>
+        <a:p>
+          <a:endParaRPr lang="en-US"/>
+        </a:p>
+      </dgm:t>
     </dgm:pt>
     <dgm:pt modelId="{AB3EBC11-6228-41FC-943A-1EC28CAE4BCA}" type="pres">
       <dgm:prSet presAssocID="{2B794F19-BBB4-40AE-8A02-005AF312B0CB}" presName="rootConnector" presStyleLbl="node2" presStyleIdx="0" presStyleCnt="3"/>
       <dgm:spPr/>
+      <dgm:t>
+        <a:bodyPr/>
+        <a:lstStyle/>
+        <a:p>
+          <a:endParaRPr lang="en-US"/>
+        </a:p>
+      </dgm:t>
     </dgm:pt>
     <dgm:pt modelId="{807D1FE8-677B-4E1F-869C-90F9C79A9587}" type="pres">
       <dgm:prSet presAssocID="{2B794F19-BBB4-40AE-8A02-005AF312B0CB}" presName="hierChild4" presStyleCnt="0"/>
@@ -2642,6 +2761,13 @@
     <dgm:pt modelId="{3C78C002-1AC3-41B3-89E0-321DB83FE365}" type="pres">
       <dgm:prSet presAssocID="{EF65000C-2AD1-426C-8C60-A38915C1E6A8}" presName="Name37" presStyleLbl="parChTrans1D2" presStyleIdx="1" presStyleCnt="4"/>
       <dgm:spPr/>
+      <dgm:t>
+        <a:bodyPr/>
+        <a:lstStyle/>
+        <a:p>
+          <a:endParaRPr lang="en-US"/>
+        </a:p>
+      </dgm:t>
     </dgm:pt>
     <dgm:pt modelId="{9468FDEC-55F6-4ECB-9D75-FE69280A6BCA}" type="pres">
       <dgm:prSet presAssocID="{E4646C87-1D5C-488E-A15A-8E32408C91C9}" presName="hierRoot2" presStyleCnt="0">
@@ -2673,6 +2799,13 @@
     <dgm:pt modelId="{CA4D75A4-41AD-41F7-B038-EA4733BE9432}" type="pres">
       <dgm:prSet presAssocID="{E4646C87-1D5C-488E-A15A-8E32408C91C9}" presName="rootConnector" presStyleLbl="node2" presStyleIdx="1" presStyleCnt="3"/>
       <dgm:spPr/>
+      <dgm:t>
+        <a:bodyPr/>
+        <a:lstStyle/>
+        <a:p>
+          <a:endParaRPr lang="en-US"/>
+        </a:p>
+      </dgm:t>
     </dgm:pt>
     <dgm:pt modelId="{EB7AEF75-88E0-4B58-AD3A-2FBD1DF82811}" type="pres">
       <dgm:prSet presAssocID="{E4646C87-1D5C-488E-A15A-8E32408C91C9}" presName="hierChild4" presStyleCnt="0"/>
@@ -2685,6 +2818,13 @@
     <dgm:pt modelId="{BB82E3A6-21E2-4321-BBF7-995CFA742628}" type="pres">
       <dgm:prSet presAssocID="{59F28D88-5C53-4A09-BB17-FC7F6B8F9ABA}" presName="Name37" presStyleLbl="parChTrans1D2" presStyleIdx="2" presStyleCnt="4"/>
       <dgm:spPr/>
+      <dgm:t>
+        <a:bodyPr/>
+        <a:lstStyle/>
+        <a:p>
+          <a:endParaRPr lang="en-US"/>
+        </a:p>
+      </dgm:t>
     </dgm:pt>
     <dgm:pt modelId="{7CA2D5D9-322B-47A2-9010-DF439DDB86BA}" type="pres">
       <dgm:prSet presAssocID="{1A9BF837-6F58-443B-A2EA-CC9579FF8901}" presName="hierRoot2" presStyleCnt="0">
@@ -2705,10 +2845,24 @@
         </dgm:presLayoutVars>
       </dgm:prSet>
       <dgm:spPr/>
+      <dgm:t>
+        <a:bodyPr/>
+        <a:lstStyle/>
+        <a:p>
+          <a:endParaRPr lang="en-US"/>
+        </a:p>
+      </dgm:t>
     </dgm:pt>
     <dgm:pt modelId="{3E5BD639-6EFF-4F6A-B5BA-0A2013892613}" type="pres">
       <dgm:prSet presAssocID="{1A9BF837-6F58-443B-A2EA-CC9579FF8901}" presName="rootConnector" presStyleLbl="node2" presStyleIdx="2" presStyleCnt="3"/>
       <dgm:spPr/>
+      <dgm:t>
+        <a:bodyPr/>
+        <a:lstStyle/>
+        <a:p>
+          <a:endParaRPr lang="en-US"/>
+        </a:p>
+      </dgm:t>
     </dgm:pt>
     <dgm:pt modelId="{166A732C-4C91-427C-824F-C19DEE09FF16}" type="pres">
       <dgm:prSet presAssocID="{1A9BF837-6F58-443B-A2EA-CC9579FF8901}" presName="hierChild4" presStyleCnt="0"/>
@@ -2725,6 +2879,13 @@
     <dgm:pt modelId="{9724640F-F9F2-4781-89B9-B9EB9C9883A2}" type="pres">
       <dgm:prSet presAssocID="{FFA7DDD0-7E6D-485C-873E-08BCDFCE6512}" presName="Name111" presStyleLbl="parChTrans1D2" presStyleIdx="3" presStyleCnt="4"/>
       <dgm:spPr/>
+      <dgm:t>
+        <a:bodyPr/>
+        <a:lstStyle/>
+        <a:p>
+          <a:endParaRPr lang="en-US"/>
+        </a:p>
+      </dgm:t>
     </dgm:pt>
     <dgm:pt modelId="{D7D7D683-A84D-4429-A621-06136D7EDA8A}" type="pres">
       <dgm:prSet presAssocID="{244EE17A-B3F9-495B-9E01-C01B9352C2A0}" presName="hierRoot3" presStyleCnt="0">
@@ -2756,6 +2917,13 @@
     <dgm:pt modelId="{9E1EFAB8-8D76-4115-B92A-45E6DD4E5EA6}" type="pres">
       <dgm:prSet presAssocID="{244EE17A-B3F9-495B-9E01-C01B9352C2A0}" presName="rootConnector3" presStyleLbl="asst1" presStyleIdx="0" presStyleCnt="1"/>
       <dgm:spPr/>
+      <dgm:t>
+        <a:bodyPr/>
+        <a:lstStyle/>
+        <a:p>
+          <a:endParaRPr lang="en-US"/>
+        </a:p>
+      </dgm:t>
     </dgm:pt>
     <dgm:pt modelId="{9FF3F31F-7C0B-4E24-9973-50710D005F1E}" type="pres">
       <dgm:prSet presAssocID="{244EE17A-B3F9-495B-9E01-C01B9352C2A0}" presName="hierChild6" presStyleCnt="0"/>
@@ -8557,7 +8725,7 @@
               <a:pPr>
                 <a:defRPr/>
               </a:pPr>
-              <a:t>12/21/2015</a:t>
+              <a:t>1/12/2016</a:t>
             </a:fld>
             <a:endParaRPr lang="en-US"/>
           </a:p>
@@ -10690,8 +10858,12 @@
           <a:p>
             <a:pPr defTabSz="914400" eaLnBrk="1" hangingPunct="1"/>
             <a:r>
+              <a:rPr lang="en-US" dirty="0"/>
+              <a:t>p</a:t>
+            </a:r>
+            <a:r>
               <a:rPr lang="en-US" dirty="0" smtClean="0"/>
-              <a:t>&lt;router-outlet&gt;</a:t>
+              <a:t>rovide(service)</a:t>
             </a:r>
           </a:p>
         </p:txBody>
@@ -10745,6 +10917,13 @@
   <p:transition>
     <p:fade/>
   </p:transition>
+  <p:timing>
+    <p:tnLst>
+      <p:par>
+        <p:cTn id="1" dur="indefinite" restart="never" nodeType="tmRoot"/>
+      </p:par>
+    </p:tnLst>
+  </p:timing>
 </p:sld>
 </file>
 
@@ -10855,6 +11034,13 @@
   <p:transition>
     <p:fade/>
   </p:transition>
+  <p:timing>
+    <p:tnLst>
+      <p:par>
+        <p:cTn id="1" dur="indefinite" restart="never" nodeType="tmRoot"/>
+      </p:par>
+    </p:tnLst>
+  </p:timing>
 </p:sld>
 </file>
 
@@ -10978,6 +11164,13 @@
   <p:transition>
     <p:fade/>
   </p:transition>
+  <p:timing>
+    <p:tnLst>
+      <p:par>
+        <p:cTn id="1" dur="indefinite" restart="never" nodeType="tmRoot"/>
+      </p:par>
+    </p:tnLst>
+  </p:timing>
 </p:sld>
 </file>
 
@@ -11093,6 +11286,13 @@
   <p:transition>
     <p:fade/>
   </p:transition>
+  <p:timing>
+    <p:tnLst>
+      <p:par>
+        <p:cTn id="1" dur="indefinite" restart="never" nodeType="tmRoot"/>
+      </p:par>
+    </p:tnLst>
+  </p:timing>
 </p:sld>
 </file>
 
@@ -11690,6 +11890,13 @@
   <p:transition>
     <p:fade/>
   </p:transition>
+  <p:timing>
+    <p:tnLst>
+      <p:par>
+        <p:cTn id="1" dur="indefinite" restart="never" nodeType="tmRoot"/>
+      </p:par>
+    </p:tnLst>
+  </p:timing>
 </p:sld>
 </file>
 
@@ -11793,6 +12000,13 @@
   <p:transition>
     <p:fade/>
   </p:transition>
+  <p:timing>
+    <p:tnLst>
+      <p:par>
+        <p:cTn id="1" dur="indefinite" restart="never" nodeType="tmRoot"/>
+      </p:par>
+    </p:tnLst>
+  </p:timing>
 </p:sld>
 </file>
 
@@ -11896,6 +12110,13 @@
   <p:transition>
     <p:fade/>
   </p:transition>
+  <p:timing>
+    <p:tnLst>
+      <p:par>
+        <p:cTn id="1" dur="indefinite" restart="never" nodeType="tmRoot"/>
+      </p:par>
+    </p:tnLst>
+  </p:timing>
 </p:sld>
 </file>
 
@@ -11997,6 +12218,13 @@
   <p:transition>
     <p:fade/>
   </p:transition>
+  <p:timing>
+    <p:tnLst>
+      <p:par>
+        <p:cTn id="1" dur="indefinite" restart="never" nodeType="tmRoot"/>
+      </p:par>
+    </p:tnLst>
+  </p:timing>
 </p:sld>
 </file>
 
@@ -13942,6 +14170,13 @@
   <p:transition>
     <p:fade/>
   </p:transition>
+  <p:timing>
+    <p:tnLst>
+      <p:par>
+        <p:cTn id="1" dur="indefinite" restart="never" nodeType="tmRoot"/>
+      </p:par>
+    </p:tnLst>
+  </p:timing>
 </p:sld>
 </file>
 
@@ -14080,6 +14315,13 @@
   <p:transition>
     <p:fade/>
   </p:transition>
+  <p:timing>
+    <p:tnLst>
+      <p:par>
+        <p:cTn id="1" dur="indefinite" restart="never" nodeType="tmRoot"/>
+      </p:par>
+    </p:tnLst>
+  </p:timing>
 </p:sld>
 </file>
 
@@ -14186,6 +14428,13 @@
   <p:transition>
     <p:fade/>
   </p:transition>
+  <p:timing>
+    <p:tnLst>
+      <p:par>
+        <p:cTn id="1" dur="indefinite" restart="never" nodeType="tmRoot"/>
+      </p:par>
+    </p:tnLst>
+  </p:timing>
 </p:sld>
 </file>
 
@@ -14310,6 +14559,13 @@
   <p:transition>
     <p:fade/>
   </p:transition>
+  <p:timing>
+    <p:tnLst>
+      <p:par>
+        <p:cTn id="1" dur="indefinite" restart="never" nodeType="tmRoot"/>
+      </p:par>
+    </p:tnLst>
+  </p:timing>
 </p:sld>
 </file>
 

</xml_diff>

<commit_message>
update services and template
</commit_message>
<xml_diff>
--- a/angular2/slides/04_Services_DI.pptx
+++ b/angular2/slides/04_Services_DI.pptx
@@ -1723,13 +1723,13 @@
         <a:lstStyle/>
         <a:p>
           <a:r>
-            <a:rPr lang="en-US" sz="2100" dirty="0" smtClean="0"/>
+            <a:rPr lang="en-US" sz="2100" dirty="0"/>
             <a:t>App</a:t>
           </a:r>
         </a:p>
         <a:p>
           <a:r>
-            <a:rPr lang="en-US" sz="1200" dirty="0" err="1" smtClean="0"/>
+            <a:rPr lang="en-US" sz="1200" dirty="0" err="1"/>
             <a:t>LogService</a:t>
           </a:r>
           <a:endParaRPr lang="en-US" sz="1200" dirty="0"/>
@@ -1783,14 +1783,14 @@
         <a:lstStyle/>
         <a:p>
           <a:r>
-            <a:rPr lang="en-US" sz="2100" dirty="0" err="1" smtClean="0"/>
+            <a:rPr lang="en-US" sz="2100" dirty="0" err="1"/>
             <a:t>MovieList</a:t>
           </a:r>
-          <a:endParaRPr lang="en-US" sz="2100" dirty="0" smtClean="0"/>
+          <a:endParaRPr lang="en-US" sz="2100" dirty="0"/>
         </a:p>
         <a:p>
           <a:r>
-            <a:rPr lang="en-US" sz="1200" dirty="0" err="1" smtClean="0"/>
+            <a:rPr lang="en-US" sz="1200" dirty="0" err="1"/>
             <a:t>MovieService</a:t>
           </a:r>
           <a:endParaRPr lang="en-US" sz="1200" dirty="0"/>
@@ -1844,10 +1844,9 @@
         <a:lstStyle/>
         <a:p>
           <a:r>
-            <a:rPr lang="en-US" sz="2000" dirty="0" smtClean="0"/>
+            <a:rPr lang="en-US" sz="2000" dirty="0"/>
             <a:t>Detail</a:t>
           </a:r>
-          <a:endParaRPr lang="en-US" sz="2000" dirty="0"/>
         </a:p>
       </dgm:t>
     </dgm:pt>
@@ -1898,10 +1897,9 @@
         <a:lstStyle/>
         <a:p>
           <a:r>
-            <a:rPr lang="en-US" sz="2000" dirty="0" smtClean="0"/>
+            <a:rPr lang="en-US" sz="2000" dirty="0"/>
             <a:t>Review</a:t>
           </a:r>
-          <a:endParaRPr lang="en-US" sz="2000" dirty="0"/>
         </a:p>
       </dgm:t>
     </dgm:pt>
@@ -1952,10 +1950,9 @@
         <a:lstStyle/>
         <a:p>
           <a:r>
-            <a:rPr lang="en-US" sz="2000" dirty="0" smtClean="0"/>
+            <a:rPr lang="en-US" sz="2000" dirty="0"/>
             <a:t>Comment</a:t>
           </a:r>
-          <a:endParaRPr lang="en-US" sz="2000" dirty="0"/>
         </a:p>
       </dgm:t>
     </dgm:pt>
@@ -1993,13 +1990,6 @@
         </dgm:presLayoutVars>
       </dgm:prSet>
       <dgm:spPr/>
-      <dgm:t>
-        <a:bodyPr/>
-        <a:lstStyle/>
-        <a:p>
-          <a:endParaRPr lang="en-US"/>
-        </a:p>
-      </dgm:t>
     </dgm:pt>
     <dgm:pt modelId="{36FC6E05-4100-4145-9EBC-BA82AA18A8E6}" type="pres">
       <dgm:prSet presAssocID="{51FC4258-6D06-494F-91D0-050FBAAE2821}" presName="hierRoot1" presStyleCnt="0">
@@ -2020,24 +2010,10 @@
         </dgm:presLayoutVars>
       </dgm:prSet>
       <dgm:spPr/>
-      <dgm:t>
-        <a:bodyPr/>
-        <a:lstStyle/>
-        <a:p>
-          <a:endParaRPr lang="en-US"/>
-        </a:p>
-      </dgm:t>
     </dgm:pt>
     <dgm:pt modelId="{6FA1F303-F81F-4086-8CA8-C5C45FB8D5DD}" type="pres">
       <dgm:prSet presAssocID="{51FC4258-6D06-494F-91D0-050FBAAE2821}" presName="rootConnector1" presStyleLbl="node1" presStyleIdx="0" presStyleCnt="0"/>
       <dgm:spPr/>
-      <dgm:t>
-        <a:bodyPr/>
-        <a:lstStyle/>
-        <a:p>
-          <a:endParaRPr lang="en-US"/>
-        </a:p>
-      </dgm:t>
     </dgm:pt>
     <dgm:pt modelId="{78F136E0-DE43-40A1-B592-CB0AF99F9F28}" type="pres">
       <dgm:prSet presAssocID="{51FC4258-6D06-494F-91D0-050FBAAE2821}" presName="hierChild2" presStyleCnt="0"/>
@@ -2046,13 +2022,6 @@
     <dgm:pt modelId="{37C0986C-7A4F-4D80-AB86-E1DF3A130412}" type="pres">
       <dgm:prSet presAssocID="{41620FA9-438D-479B-BE8A-9241C7529B97}" presName="Name37" presStyleLbl="parChTrans1D2" presStyleIdx="0" presStyleCnt="4"/>
       <dgm:spPr/>
-      <dgm:t>
-        <a:bodyPr/>
-        <a:lstStyle/>
-        <a:p>
-          <a:endParaRPr lang="en-US"/>
-        </a:p>
-      </dgm:t>
     </dgm:pt>
     <dgm:pt modelId="{6CF9FFE0-BE7E-488C-BB81-3BA7137E5440}" type="pres">
       <dgm:prSet presAssocID="{2B794F19-BBB4-40AE-8A02-005AF312B0CB}" presName="hierRoot2" presStyleCnt="0">
@@ -2073,24 +2042,10 @@
         </dgm:presLayoutVars>
       </dgm:prSet>
       <dgm:spPr/>
-      <dgm:t>
-        <a:bodyPr/>
-        <a:lstStyle/>
-        <a:p>
-          <a:endParaRPr lang="en-US"/>
-        </a:p>
-      </dgm:t>
     </dgm:pt>
     <dgm:pt modelId="{AB3EBC11-6228-41FC-943A-1EC28CAE4BCA}" type="pres">
       <dgm:prSet presAssocID="{2B794F19-BBB4-40AE-8A02-005AF312B0CB}" presName="rootConnector" presStyleLbl="node2" presStyleIdx="0" presStyleCnt="3"/>
       <dgm:spPr/>
-      <dgm:t>
-        <a:bodyPr/>
-        <a:lstStyle/>
-        <a:p>
-          <a:endParaRPr lang="en-US"/>
-        </a:p>
-      </dgm:t>
     </dgm:pt>
     <dgm:pt modelId="{807D1FE8-677B-4E1F-869C-90F9C79A9587}" type="pres">
       <dgm:prSet presAssocID="{2B794F19-BBB4-40AE-8A02-005AF312B0CB}" presName="hierChild4" presStyleCnt="0"/>
@@ -2103,13 +2058,6 @@
     <dgm:pt modelId="{3C78C002-1AC3-41B3-89E0-321DB83FE365}" type="pres">
       <dgm:prSet presAssocID="{EF65000C-2AD1-426C-8C60-A38915C1E6A8}" presName="Name37" presStyleLbl="parChTrans1D2" presStyleIdx="1" presStyleCnt="4"/>
       <dgm:spPr/>
-      <dgm:t>
-        <a:bodyPr/>
-        <a:lstStyle/>
-        <a:p>
-          <a:endParaRPr lang="en-US"/>
-        </a:p>
-      </dgm:t>
     </dgm:pt>
     <dgm:pt modelId="{9468FDEC-55F6-4ECB-9D75-FE69280A6BCA}" type="pres">
       <dgm:prSet presAssocID="{E4646C87-1D5C-488E-A15A-8E32408C91C9}" presName="hierRoot2" presStyleCnt="0">
@@ -2130,24 +2078,10 @@
         </dgm:presLayoutVars>
       </dgm:prSet>
       <dgm:spPr/>
-      <dgm:t>
-        <a:bodyPr/>
-        <a:lstStyle/>
-        <a:p>
-          <a:endParaRPr lang="en-US"/>
-        </a:p>
-      </dgm:t>
     </dgm:pt>
     <dgm:pt modelId="{CA4D75A4-41AD-41F7-B038-EA4733BE9432}" type="pres">
       <dgm:prSet presAssocID="{E4646C87-1D5C-488E-A15A-8E32408C91C9}" presName="rootConnector" presStyleLbl="node2" presStyleIdx="1" presStyleCnt="3"/>
       <dgm:spPr/>
-      <dgm:t>
-        <a:bodyPr/>
-        <a:lstStyle/>
-        <a:p>
-          <a:endParaRPr lang="en-US"/>
-        </a:p>
-      </dgm:t>
     </dgm:pt>
     <dgm:pt modelId="{EB7AEF75-88E0-4B58-AD3A-2FBD1DF82811}" type="pres">
       <dgm:prSet presAssocID="{E4646C87-1D5C-488E-A15A-8E32408C91C9}" presName="hierChild4" presStyleCnt="0"/>
@@ -2160,13 +2094,6 @@
     <dgm:pt modelId="{BB82E3A6-21E2-4321-BBF7-995CFA742628}" type="pres">
       <dgm:prSet presAssocID="{59F28D88-5C53-4A09-BB17-FC7F6B8F9ABA}" presName="Name37" presStyleLbl="parChTrans1D2" presStyleIdx="2" presStyleCnt="4"/>
       <dgm:spPr/>
-      <dgm:t>
-        <a:bodyPr/>
-        <a:lstStyle/>
-        <a:p>
-          <a:endParaRPr lang="en-US"/>
-        </a:p>
-      </dgm:t>
     </dgm:pt>
     <dgm:pt modelId="{7CA2D5D9-322B-47A2-9010-DF439DDB86BA}" type="pres">
       <dgm:prSet presAssocID="{1A9BF837-6F58-443B-A2EA-CC9579FF8901}" presName="hierRoot2" presStyleCnt="0">
@@ -2187,24 +2114,10 @@
         </dgm:presLayoutVars>
       </dgm:prSet>
       <dgm:spPr/>
-      <dgm:t>
-        <a:bodyPr/>
-        <a:lstStyle/>
-        <a:p>
-          <a:endParaRPr lang="en-US"/>
-        </a:p>
-      </dgm:t>
     </dgm:pt>
     <dgm:pt modelId="{3E5BD639-6EFF-4F6A-B5BA-0A2013892613}" type="pres">
       <dgm:prSet presAssocID="{1A9BF837-6F58-443B-A2EA-CC9579FF8901}" presName="rootConnector" presStyleLbl="node2" presStyleIdx="2" presStyleCnt="3"/>
       <dgm:spPr/>
-      <dgm:t>
-        <a:bodyPr/>
-        <a:lstStyle/>
-        <a:p>
-          <a:endParaRPr lang="en-US"/>
-        </a:p>
-      </dgm:t>
     </dgm:pt>
     <dgm:pt modelId="{166A732C-4C91-427C-824F-C19DEE09FF16}" type="pres">
       <dgm:prSet presAssocID="{1A9BF837-6F58-443B-A2EA-CC9579FF8901}" presName="hierChild4" presStyleCnt="0"/>
@@ -2221,13 +2134,6 @@
     <dgm:pt modelId="{9724640F-F9F2-4781-89B9-B9EB9C9883A2}" type="pres">
       <dgm:prSet presAssocID="{FFA7DDD0-7E6D-485C-873E-08BCDFCE6512}" presName="Name111" presStyleLbl="parChTrans1D2" presStyleIdx="3" presStyleCnt="4"/>
       <dgm:spPr/>
-      <dgm:t>
-        <a:bodyPr/>
-        <a:lstStyle/>
-        <a:p>
-          <a:endParaRPr lang="en-US"/>
-        </a:p>
-      </dgm:t>
     </dgm:pt>
     <dgm:pt modelId="{D7D7D683-A84D-4429-A621-06136D7EDA8A}" type="pres">
       <dgm:prSet presAssocID="{244EE17A-B3F9-495B-9E01-C01B9352C2A0}" presName="hierRoot3" presStyleCnt="0">
@@ -2248,24 +2154,10 @@
         </dgm:presLayoutVars>
       </dgm:prSet>
       <dgm:spPr/>
-      <dgm:t>
-        <a:bodyPr/>
-        <a:lstStyle/>
-        <a:p>
-          <a:endParaRPr lang="en-US"/>
-        </a:p>
-      </dgm:t>
     </dgm:pt>
     <dgm:pt modelId="{9E1EFAB8-8D76-4115-B92A-45E6DD4E5EA6}" type="pres">
       <dgm:prSet presAssocID="{244EE17A-B3F9-495B-9E01-C01B9352C2A0}" presName="rootConnector3" presStyleLbl="asst1" presStyleIdx="0" presStyleCnt="1"/>
       <dgm:spPr/>
-      <dgm:t>
-        <a:bodyPr/>
-        <a:lstStyle/>
-        <a:p>
-          <a:endParaRPr lang="en-US"/>
-        </a:p>
-      </dgm:t>
     </dgm:pt>
     <dgm:pt modelId="{9FF3F31F-7C0B-4E24-9973-50710D005F1E}" type="pres">
       <dgm:prSet presAssocID="{244EE17A-B3F9-495B-9E01-C01B9352C2A0}" presName="hierChild6" presStyleCnt="0"/>
@@ -2277,26 +2169,26 @@
     </dgm:pt>
   </dgm:ptLst>
   <dgm:cxnLst>
+    <dgm:cxn modelId="{73404C83-17E3-490D-8B5A-DE6F145D35E0}" type="presOf" srcId="{244EE17A-B3F9-495B-9E01-C01B9352C2A0}" destId="{9E1EFAB8-8D76-4115-B92A-45E6DD4E5EA6}" srcOrd="1" destOrd="0" presId="urn:microsoft.com/office/officeart/2005/8/layout/orgChart1"/>
+    <dgm:cxn modelId="{B5BDA5E3-E00F-4CC9-A2D2-6B1D5A6BE670}" srcId="{51FC4258-6D06-494F-91D0-050FBAAE2821}" destId="{244EE17A-B3F9-495B-9E01-C01B9352C2A0}" srcOrd="0" destOrd="0" parTransId="{FFA7DDD0-7E6D-485C-873E-08BCDFCE6512}" sibTransId="{CFC50FDF-712E-46A8-9E0E-4B21AB91301D}"/>
+    <dgm:cxn modelId="{740756A3-00C1-4F4A-B6DC-E37C718AF4B0}" type="presOf" srcId="{FFA7DDD0-7E6D-485C-873E-08BCDFCE6512}" destId="{9724640F-F9F2-4781-89B9-B9EB9C9883A2}" srcOrd="0" destOrd="0" presId="urn:microsoft.com/office/officeart/2005/8/layout/orgChart1"/>
+    <dgm:cxn modelId="{0440CD5E-AB5C-44DA-9233-1D76214DE653}" srcId="{51FC4258-6D06-494F-91D0-050FBAAE2821}" destId="{2B794F19-BBB4-40AE-8A02-005AF312B0CB}" srcOrd="1" destOrd="0" parTransId="{41620FA9-438D-479B-BE8A-9241C7529B97}" sibTransId="{BF6DB499-D8FD-4434-9E19-42D8981326F4}"/>
+    <dgm:cxn modelId="{90919E10-F34D-4839-9C2D-F453539D88F8}" type="presOf" srcId="{244EE17A-B3F9-495B-9E01-C01B9352C2A0}" destId="{809594D5-42AB-48C3-B007-ED5329F84148}" srcOrd="0" destOrd="0" presId="urn:microsoft.com/office/officeart/2005/8/layout/orgChart1"/>
+    <dgm:cxn modelId="{223D2CEC-40FF-4DD7-A063-4C769A744038}" type="presOf" srcId="{41620FA9-438D-479B-BE8A-9241C7529B97}" destId="{37C0986C-7A4F-4D80-AB86-E1DF3A130412}" srcOrd="0" destOrd="0" presId="urn:microsoft.com/office/officeart/2005/8/layout/orgChart1"/>
+    <dgm:cxn modelId="{1DA36077-703A-44E9-BF10-60D0DC4D5031}" type="presOf" srcId="{2992D994-0831-4186-B42F-5FB754E9E498}" destId="{73D38206-EB39-40CF-9A3B-551DBA203F41}" srcOrd="0" destOrd="0" presId="urn:microsoft.com/office/officeart/2005/8/layout/orgChart1"/>
+    <dgm:cxn modelId="{C12E1252-CDA1-4826-8241-678061B2BE29}" type="presOf" srcId="{EF65000C-2AD1-426C-8C60-A38915C1E6A8}" destId="{3C78C002-1AC3-41B3-89E0-321DB83FE365}" srcOrd="0" destOrd="0" presId="urn:microsoft.com/office/officeart/2005/8/layout/orgChart1"/>
+    <dgm:cxn modelId="{00A879CC-487A-4113-8BCA-4E49794933AC}" type="presOf" srcId="{1A9BF837-6F58-443B-A2EA-CC9579FF8901}" destId="{3E5BD639-6EFF-4F6A-B5BA-0A2013892613}" srcOrd="1" destOrd="0" presId="urn:microsoft.com/office/officeart/2005/8/layout/orgChart1"/>
     <dgm:cxn modelId="{1506DDD0-FE47-4C18-99A3-D50C1C8BE83A}" type="presOf" srcId="{E4646C87-1D5C-488E-A15A-8E32408C91C9}" destId="{CA4D75A4-41AD-41F7-B038-EA4733BE9432}" srcOrd="1" destOrd="0" presId="urn:microsoft.com/office/officeart/2005/8/layout/orgChart1"/>
-    <dgm:cxn modelId="{00A879CC-487A-4113-8BCA-4E49794933AC}" type="presOf" srcId="{1A9BF837-6F58-443B-A2EA-CC9579FF8901}" destId="{3E5BD639-6EFF-4F6A-B5BA-0A2013892613}" srcOrd="1" destOrd="0" presId="urn:microsoft.com/office/officeart/2005/8/layout/orgChart1"/>
-    <dgm:cxn modelId="{6640B9E6-3C1A-43B6-8E07-9E83EEAB3886}" type="presOf" srcId="{51FC4258-6D06-494F-91D0-050FBAAE2821}" destId="{6FA1F303-F81F-4086-8CA8-C5C45FB8D5DD}" srcOrd="1" destOrd="0" presId="urn:microsoft.com/office/officeart/2005/8/layout/orgChart1"/>
-    <dgm:cxn modelId="{223D2CEC-40FF-4DD7-A063-4C769A744038}" type="presOf" srcId="{41620FA9-438D-479B-BE8A-9241C7529B97}" destId="{37C0986C-7A4F-4D80-AB86-E1DF3A130412}" srcOrd="0" destOrd="0" presId="urn:microsoft.com/office/officeart/2005/8/layout/orgChart1"/>
+    <dgm:cxn modelId="{FF362330-928F-4AD5-8D95-E2408ECDD2FD}" type="presOf" srcId="{E4646C87-1D5C-488E-A15A-8E32408C91C9}" destId="{EC0D1E2C-77F3-46FF-84D8-9F34BF30D0DB}" srcOrd="0" destOrd="0" presId="urn:microsoft.com/office/officeart/2005/8/layout/orgChart1"/>
+    <dgm:cxn modelId="{74677EB2-B0AA-4675-B661-AFE8C12DEB18}" type="presOf" srcId="{2B794F19-BBB4-40AE-8A02-005AF312B0CB}" destId="{AB3EBC11-6228-41FC-943A-1EC28CAE4BCA}" srcOrd="1" destOrd="0" presId="urn:microsoft.com/office/officeart/2005/8/layout/orgChart1"/>
     <dgm:cxn modelId="{AF86FFA2-6D0D-4082-B031-0D7D5A3641A5}" srcId="{2992D994-0831-4186-B42F-5FB754E9E498}" destId="{51FC4258-6D06-494F-91D0-050FBAAE2821}" srcOrd="0" destOrd="0" parTransId="{4AB7D006-6848-4F84-BCDF-1001AC17D8D8}" sibTransId="{FB4ECDA2-7274-4EFD-B8B0-CA6429DFB7D0}"/>
     <dgm:cxn modelId="{BB8B446D-9169-4195-8054-616EFF64B965}" srcId="{51FC4258-6D06-494F-91D0-050FBAAE2821}" destId="{1A9BF837-6F58-443B-A2EA-CC9579FF8901}" srcOrd="3" destOrd="0" parTransId="{59F28D88-5C53-4A09-BB17-FC7F6B8F9ABA}" sibTransId="{4C0DBC71-5E47-41D3-B719-23AD97A05620}"/>
-    <dgm:cxn modelId="{1DA36077-703A-44E9-BF10-60D0DC4D5031}" type="presOf" srcId="{2992D994-0831-4186-B42F-5FB754E9E498}" destId="{73D38206-EB39-40CF-9A3B-551DBA203F41}" srcOrd="0" destOrd="0" presId="urn:microsoft.com/office/officeart/2005/8/layout/orgChart1"/>
-    <dgm:cxn modelId="{740756A3-00C1-4F4A-B6DC-E37C718AF4B0}" type="presOf" srcId="{FFA7DDD0-7E6D-485C-873E-08BCDFCE6512}" destId="{9724640F-F9F2-4781-89B9-B9EB9C9883A2}" srcOrd="0" destOrd="0" presId="urn:microsoft.com/office/officeart/2005/8/layout/orgChart1"/>
-    <dgm:cxn modelId="{0440CD5E-AB5C-44DA-9233-1D76214DE653}" srcId="{51FC4258-6D06-494F-91D0-050FBAAE2821}" destId="{2B794F19-BBB4-40AE-8A02-005AF312B0CB}" srcOrd="1" destOrd="0" parTransId="{41620FA9-438D-479B-BE8A-9241C7529B97}" sibTransId="{BF6DB499-D8FD-4434-9E19-42D8981326F4}"/>
-    <dgm:cxn modelId="{FF362330-928F-4AD5-8D95-E2408ECDD2FD}" type="presOf" srcId="{E4646C87-1D5C-488E-A15A-8E32408C91C9}" destId="{EC0D1E2C-77F3-46FF-84D8-9F34BF30D0DB}" srcOrd="0" destOrd="0" presId="urn:microsoft.com/office/officeart/2005/8/layout/orgChart1"/>
+    <dgm:cxn modelId="{8FA46886-A422-478F-8953-572A60995862}" type="presOf" srcId="{2B794F19-BBB4-40AE-8A02-005AF312B0CB}" destId="{234A27DB-36A9-4447-A301-7454150C07B6}" srcOrd="0" destOrd="0" presId="urn:microsoft.com/office/officeart/2005/8/layout/orgChart1"/>
+    <dgm:cxn modelId="{6640B9E6-3C1A-43B6-8E07-9E83EEAB3886}" type="presOf" srcId="{51FC4258-6D06-494F-91D0-050FBAAE2821}" destId="{6FA1F303-F81F-4086-8CA8-C5C45FB8D5DD}" srcOrd="1" destOrd="0" presId="urn:microsoft.com/office/officeart/2005/8/layout/orgChart1"/>
     <dgm:cxn modelId="{F2942F07-8925-4CC9-90C0-46A11CF03B7A}" type="presOf" srcId="{59F28D88-5C53-4A09-BB17-FC7F6B8F9ABA}" destId="{BB82E3A6-21E2-4321-BBF7-995CFA742628}" srcOrd="0" destOrd="0" presId="urn:microsoft.com/office/officeart/2005/8/layout/orgChart1"/>
-    <dgm:cxn modelId="{73404C83-17E3-490D-8B5A-DE6F145D35E0}" type="presOf" srcId="{244EE17A-B3F9-495B-9E01-C01B9352C2A0}" destId="{9E1EFAB8-8D76-4115-B92A-45E6DD4E5EA6}" srcOrd="1" destOrd="0" presId="urn:microsoft.com/office/officeart/2005/8/layout/orgChart1"/>
-    <dgm:cxn modelId="{8FA46886-A422-478F-8953-572A60995862}" type="presOf" srcId="{2B794F19-BBB4-40AE-8A02-005AF312B0CB}" destId="{234A27DB-36A9-4447-A301-7454150C07B6}" srcOrd="0" destOrd="0" presId="urn:microsoft.com/office/officeart/2005/8/layout/orgChart1"/>
-    <dgm:cxn modelId="{C12E1252-CDA1-4826-8241-678061B2BE29}" type="presOf" srcId="{EF65000C-2AD1-426C-8C60-A38915C1E6A8}" destId="{3C78C002-1AC3-41B3-89E0-321DB83FE365}" srcOrd="0" destOrd="0" presId="urn:microsoft.com/office/officeart/2005/8/layout/orgChart1"/>
-    <dgm:cxn modelId="{90919E10-F34D-4839-9C2D-F453539D88F8}" type="presOf" srcId="{244EE17A-B3F9-495B-9E01-C01B9352C2A0}" destId="{809594D5-42AB-48C3-B007-ED5329F84148}" srcOrd="0" destOrd="0" presId="urn:microsoft.com/office/officeart/2005/8/layout/orgChart1"/>
     <dgm:cxn modelId="{52D74390-1A9B-4077-AB3F-5541CBC92BF6}" type="presOf" srcId="{51FC4258-6D06-494F-91D0-050FBAAE2821}" destId="{60FACEAF-2A4B-4F0B-BCDC-B97101F53B65}" srcOrd="0" destOrd="0" presId="urn:microsoft.com/office/officeart/2005/8/layout/orgChart1"/>
+    <dgm:cxn modelId="{DA751E37-56AC-424D-BBF4-BB82EA01757C}" type="presOf" srcId="{1A9BF837-6F58-443B-A2EA-CC9579FF8901}" destId="{99995B44-FB4D-4521-895D-42A906C789F2}" srcOrd="0" destOrd="0" presId="urn:microsoft.com/office/officeart/2005/8/layout/orgChart1"/>
     <dgm:cxn modelId="{CA58696D-1268-4EA4-A96D-79E746BCCEFB}" srcId="{51FC4258-6D06-494F-91D0-050FBAAE2821}" destId="{E4646C87-1D5C-488E-A15A-8E32408C91C9}" srcOrd="2" destOrd="0" parTransId="{EF65000C-2AD1-426C-8C60-A38915C1E6A8}" sibTransId="{38942D74-3F53-47FA-880A-D4A116972DB2}"/>
-    <dgm:cxn modelId="{74677EB2-B0AA-4675-B661-AFE8C12DEB18}" type="presOf" srcId="{2B794F19-BBB4-40AE-8A02-005AF312B0CB}" destId="{AB3EBC11-6228-41FC-943A-1EC28CAE4BCA}" srcOrd="1" destOrd="0" presId="urn:microsoft.com/office/officeart/2005/8/layout/orgChart1"/>
-    <dgm:cxn modelId="{DA751E37-56AC-424D-BBF4-BB82EA01757C}" type="presOf" srcId="{1A9BF837-6F58-443B-A2EA-CC9579FF8901}" destId="{99995B44-FB4D-4521-895D-42A906C789F2}" srcOrd="0" destOrd="0" presId="urn:microsoft.com/office/officeart/2005/8/layout/orgChart1"/>
-    <dgm:cxn modelId="{B5BDA5E3-E00F-4CC9-A2D2-6B1D5A6BE670}" srcId="{51FC4258-6D06-494F-91D0-050FBAAE2821}" destId="{244EE17A-B3F9-495B-9E01-C01B9352C2A0}" srcOrd="0" destOrd="0" parTransId="{FFA7DDD0-7E6D-485C-873E-08BCDFCE6512}" sibTransId="{CFC50FDF-712E-46A8-9E0E-4B21AB91301D}"/>
     <dgm:cxn modelId="{9CD69AAE-8A0F-40AE-B1A3-27910EB92D28}" type="presParOf" srcId="{73D38206-EB39-40CF-9A3B-551DBA203F41}" destId="{36FC6E05-4100-4145-9EBC-BA82AA18A8E6}" srcOrd="0" destOrd="0" presId="urn:microsoft.com/office/officeart/2005/8/layout/orgChart1"/>
     <dgm:cxn modelId="{4FC588D0-6593-445A-8199-5E39F0B25DF6}" type="presParOf" srcId="{36FC6E05-4100-4145-9EBC-BA82AA18A8E6}" destId="{AA56CCD4-AD31-4915-B8AB-19DBF64E4A44}" srcOrd="0" destOrd="0" presId="urn:microsoft.com/office/officeart/2005/8/layout/orgChart1"/>
     <dgm:cxn modelId="{F17391C9-2C69-47C8-B42D-1F920E8F3447}" type="presParOf" srcId="{AA56CCD4-AD31-4915-B8AB-19DBF64E4A44}" destId="{60FACEAF-2A4B-4F0B-BCDC-B97101F53B65}" srcOrd="0" destOrd="0" presId="urn:microsoft.com/office/officeart/2005/8/layout/orgChart1"/>
@@ -2381,13 +2273,13 @@
         <a:lstStyle/>
         <a:p>
           <a:r>
-            <a:rPr lang="en-US" sz="2100" dirty="0" smtClean="0"/>
+            <a:rPr lang="en-US" sz="2100" dirty="0"/>
             <a:t>App</a:t>
           </a:r>
         </a:p>
         <a:p>
           <a:r>
-            <a:rPr lang="en-US" sz="1200" dirty="0" err="1" smtClean="0"/>
+            <a:rPr lang="en-US" sz="1200" dirty="0" err="1"/>
             <a:t>LogService</a:t>
           </a:r>
           <a:endParaRPr lang="en-US" sz="1200" dirty="0"/>
@@ -2441,14 +2333,14 @@
         <a:lstStyle/>
         <a:p>
           <a:r>
-            <a:rPr lang="en-US" sz="2100" dirty="0" err="1" smtClean="0"/>
+            <a:rPr lang="en-US" sz="2100" dirty="0" err="1"/>
             <a:t>MovieList</a:t>
           </a:r>
-          <a:endParaRPr lang="en-US" sz="2100" dirty="0" smtClean="0"/>
+          <a:endParaRPr lang="en-US" sz="2100" dirty="0"/>
         </a:p>
         <a:p>
           <a:r>
-            <a:rPr lang="en-US" sz="1200" dirty="0" err="1" smtClean="0"/>
+            <a:rPr lang="en-US" sz="1200" dirty="0" err="1"/>
             <a:t>MovieService</a:t>
           </a:r>
           <a:endParaRPr lang="en-US" sz="1200" dirty="0"/>
@@ -2502,10 +2394,9 @@
         <a:lstStyle/>
         <a:p>
           <a:r>
-            <a:rPr lang="en-US" sz="2000" dirty="0" smtClean="0"/>
+            <a:rPr lang="en-US" sz="2000" dirty="0"/>
             <a:t>Detail</a:t>
           </a:r>
-          <a:endParaRPr lang="en-US" sz="2000" dirty="0"/>
         </a:p>
       </dgm:t>
     </dgm:pt>
@@ -2556,10 +2447,9 @@
         <a:lstStyle/>
         <a:p>
           <a:r>
-            <a:rPr lang="en-US" sz="2000" dirty="0" smtClean="0"/>
+            <a:rPr lang="en-US" sz="2000" dirty="0"/>
             <a:t>Review</a:t>
           </a:r>
-          <a:endParaRPr lang="en-US" sz="2000" dirty="0"/>
         </a:p>
       </dgm:t>
     </dgm:pt>
@@ -2610,10 +2500,9 @@
         <a:lstStyle/>
         <a:p>
           <a:r>
-            <a:rPr lang="en-US" sz="2000" dirty="0" smtClean="0"/>
+            <a:rPr lang="en-US" sz="2000" dirty="0"/>
             <a:t>Comment</a:t>
           </a:r>
-          <a:endParaRPr lang="en-US" sz="2000" dirty="0"/>
         </a:p>
       </dgm:t>
     </dgm:pt>
@@ -2651,13 +2540,6 @@
         </dgm:presLayoutVars>
       </dgm:prSet>
       <dgm:spPr/>
-      <dgm:t>
-        <a:bodyPr/>
-        <a:lstStyle/>
-        <a:p>
-          <a:endParaRPr lang="en-US"/>
-        </a:p>
-      </dgm:t>
     </dgm:pt>
     <dgm:pt modelId="{36FC6E05-4100-4145-9EBC-BA82AA18A8E6}" type="pres">
       <dgm:prSet presAssocID="{51FC4258-6D06-494F-91D0-050FBAAE2821}" presName="hierRoot1" presStyleCnt="0">
@@ -2678,24 +2560,10 @@
         </dgm:presLayoutVars>
       </dgm:prSet>
       <dgm:spPr/>
-      <dgm:t>
-        <a:bodyPr/>
-        <a:lstStyle/>
-        <a:p>
-          <a:endParaRPr lang="en-US"/>
-        </a:p>
-      </dgm:t>
     </dgm:pt>
     <dgm:pt modelId="{6FA1F303-F81F-4086-8CA8-C5C45FB8D5DD}" type="pres">
       <dgm:prSet presAssocID="{51FC4258-6D06-494F-91D0-050FBAAE2821}" presName="rootConnector1" presStyleLbl="node1" presStyleIdx="0" presStyleCnt="0"/>
       <dgm:spPr/>
-      <dgm:t>
-        <a:bodyPr/>
-        <a:lstStyle/>
-        <a:p>
-          <a:endParaRPr lang="en-US"/>
-        </a:p>
-      </dgm:t>
     </dgm:pt>
     <dgm:pt modelId="{78F136E0-DE43-40A1-B592-CB0AF99F9F28}" type="pres">
       <dgm:prSet presAssocID="{51FC4258-6D06-494F-91D0-050FBAAE2821}" presName="hierChild2" presStyleCnt="0"/>
@@ -2704,13 +2572,6 @@
     <dgm:pt modelId="{37C0986C-7A4F-4D80-AB86-E1DF3A130412}" type="pres">
       <dgm:prSet presAssocID="{41620FA9-438D-479B-BE8A-9241C7529B97}" presName="Name37" presStyleLbl="parChTrans1D2" presStyleIdx="0" presStyleCnt="4"/>
       <dgm:spPr/>
-      <dgm:t>
-        <a:bodyPr/>
-        <a:lstStyle/>
-        <a:p>
-          <a:endParaRPr lang="en-US"/>
-        </a:p>
-      </dgm:t>
     </dgm:pt>
     <dgm:pt modelId="{6CF9FFE0-BE7E-488C-BB81-3BA7137E5440}" type="pres">
       <dgm:prSet presAssocID="{2B794F19-BBB4-40AE-8A02-005AF312B0CB}" presName="hierRoot2" presStyleCnt="0">
@@ -2731,24 +2592,10 @@
         </dgm:presLayoutVars>
       </dgm:prSet>
       <dgm:spPr/>
-      <dgm:t>
-        <a:bodyPr/>
-        <a:lstStyle/>
-        <a:p>
-          <a:endParaRPr lang="en-US"/>
-        </a:p>
-      </dgm:t>
     </dgm:pt>
     <dgm:pt modelId="{AB3EBC11-6228-41FC-943A-1EC28CAE4BCA}" type="pres">
       <dgm:prSet presAssocID="{2B794F19-BBB4-40AE-8A02-005AF312B0CB}" presName="rootConnector" presStyleLbl="node2" presStyleIdx="0" presStyleCnt="3"/>
       <dgm:spPr/>
-      <dgm:t>
-        <a:bodyPr/>
-        <a:lstStyle/>
-        <a:p>
-          <a:endParaRPr lang="en-US"/>
-        </a:p>
-      </dgm:t>
     </dgm:pt>
     <dgm:pt modelId="{807D1FE8-677B-4E1F-869C-90F9C79A9587}" type="pres">
       <dgm:prSet presAssocID="{2B794F19-BBB4-40AE-8A02-005AF312B0CB}" presName="hierChild4" presStyleCnt="0"/>
@@ -2761,13 +2608,6 @@
     <dgm:pt modelId="{3C78C002-1AC3-41B3-89E0-321DB83FE365}" type="pres">
       <dgm:prSet presAssocID="{EF65000C-2AD1-426C-8C60-A38915C1E6A8}" presName="Name37" presStyleLbl="parChTrans1D2" presStyleIdx="1" presStyleCnt="4"/>
       <dgm:spPr/>
-      <dgm:t>
-        <a:bodyPr/>
-        <a:lstStyle/>
-        <a:p>
-          <a:endParaRPr lang="en-US"/>
-        </a:p>
-      </dgm:t>
     </dgm:pt>
     <dgm:pt modelId="{9468FDEC-55F6-4ECB-9D75-FE69280A6BCA}" type="pres">
       <dgm:prSet presAssocID="{E4646C87-1D5C-488E-A15A-8E32408C91C9}" presName="hierRoot2" presStyleCnt="0">
@@ -2788,24 +2628,10 @@
         </dgm:presLayoutVars>
       </dgm:prSet>
       <dgm:spPr/>
-      <dgm:t>
-        <a:bodyPr/>
-        <a:lstStyle/>
-        <a:p>
-          <a:endParaRPr lang="en-US"/>
-        </a:p>
-      </dgm:t>
     </dgm:pt>
     <dgm:pt modelId="{CA4D75A4-41AD-41F7-B038-EA4733BE9432}" type="pres">
       <dgm:prSet presAssocID="{E4646C87-1D5C-488E-A15A-8E32408C91C9}" presName="rootConnector" presStyleLbl="node2" presStyleIdx="1" presStyleCnt="3"/>
       <dgm:spPr/>
-      <dgm:t>
-        <a:bodyPr/>
-        <a:lstStyle/>
-        <a:p>
-          <a:endParaRPr lang="en-US"/>
-        </a:p>
-      </dgm:t>
     </dgm:pt>
     <dgm:pt modelId="{EB7AEF75-88E0-4B58-AD3A-2FBD1DF82811}" type="pres">
       <dgm:prSet presAssocID="{E4646C87-1D5C-488E-A15A-8E32408C91C9}" presName="hierChild4" presStyleCnt="0"/>
@@ -2818,13 +2644,6 @@
     <dgm:pt modelId="{BB82E3A6-21E2-4321-BBF7-995CFA742628}" type="pres">
       <dgm:prSet presAssocID="{59F28D88-5C53-4A09-BB17-FC7F6B8F9ABA}" presName="Name37" presStyleLbl="parChTrans1D2" presStyleIdx="2" presStyleCnt="4"/>
       <dgm:spPr/>
-      <dgm:t>
-        <a:bodyPr/>
-        <a:lstStyle/>
-        <a:p>
-          <a:endParaRPr lang="en-US"/>
-        </a:p>
-      </dgm:t>
     </dgm:pt>
     <dgm:pt modelId="{7CA2D5D9-322B-47A2-9010-DF439DDB86BA}" type="pres">
       <dgm:prSet presAssocID="{1A9BF837-6F58-443B-A2EA-CC9579FF8901}" presName="hierRoot2" presStyleCnt="0">
@@ -2845,24 +2664,10 @@
         </dgm:presLayoutVars>
       </dgm:prSet>
       <dgm:spPr/>
-      <dgm:t>
-        <a:bodyPr/>
-        <a:lstStyle/>
-        <a:p>
-          <a:endParaRPr lang="en-US"/>
-        </a:p>
-      </dgm:t>
     </dgm:pt>
     <dgm:pt modelId="{3E5BD639-6EFF-4F6A-B5BA-0A2013892613}" type="pres">
       <dgm:prSet presAssocID="{1A9BF837-6F58-443B-A2EA-CC9579FF8901}" presName="rootConnector" presStyleLbl="node2" presStyleIdx="2" presStyleCnt="3"/>
       <dgm:spPr/>
-      <dgm:t>
-        <a:bodyPr/>
-        <a:lstStyle/>
-        <a:p>
-          <a:endParaRPr lang="en-US"/>
-        </a:p>
-      </dgm:t>
     </dgm:pt>
     <dgm:pt modelId="{166A732C-4C91-427C-824F-C19DEE09FF16}" type="pres">
       <dgm:prSet presAssocID="{1A9BF837-6F58-443B-A2EA-CC9579FF8901}" presName="hierChild4" presStyleCnt="0"/>
@@ -2879,13 +2684,6 @@
     <dgm:pt modelId="{9724640F-F9F2-4781-89B9-B9EB9C9883A2}" type="pres">
       <dgm:prSet presAssocID="{FFA7DDD0-7E6D-485C-873E-08BCDFCE6512}" presName="Name111" presStyleLbl="parChTrans1D2" presStyleIdx="3" presStyleCnt="4"/>
       <dgm:spPr/>
-      <dgm:t>
-        <a:bodyPr/>
-        <a:lstStyle/>
-        <a:p>
-          <a:endParaRPr lang="en-US"/>
-        </a:p>
-      </dgm:t>
     </dgm:pt>
     <dgm:pt modelId="{D7D7D683-A84D-4429-A621-06136D7EDA8A}" type="pres">
       <dgm:prSet presAssocID="{244EE17A-B3F9-495B-9E01-C01B9352C2A0}" presName="hierRoot3" presStyleCnt="0">
@@ -2906,24 +2704,10 @@
         </dgm:presLayoutVars>
       </dgm:prSet>
       <dgm:spPr/>
-      <dgm:t>
-        <a:bodyPr/>
-        <a:lstStyle/>
-        <a:p>
-          <a:endParaRPr lang="en-US"/>
-        </a:p>
-      </dgm:t>
     </dgm:pt>
     <dgm:pt modelId="{9E1EFAB8-8D76-4115-B92A-45E6DD4E5EA6}" type="pres">
       <dgm:prSet presAssocID="{244EE17A-B3F9-495B-9E01-C01B9352C2A0}" presName="rootConnector3" presStyleLbl="asst1" presStyleIdx="0" presStyleCnt="1"/>
       <dgm:spPr/>
-      <dgm:t>
-        <a:bodyPr/>
-        <a:lstStyle/>
-        <a:p>
-          <a:endParaRPr lang="en-US"/>
-        </a:p>
-      </dgm:t>
     </dgm:pt>
     <dgm:pt modelId="{9FF3F31F-7C0B-4E24-9973-50710D005F1E}" type="pres">
       <dgm:prSet presAssocID="{244EE17A-B3F9-495B-9E01-C01B9352C2A0}" presName="hierChild6" presStyleCnt="0"/>
@@ -2935,26 +2719,26 @@
     </dgm:pt>
   </dgm:ptLst>
   <dgm:cxnLst>
-    <dgm:cxn modelId="{73404C83-17E3-490D-8B5A-DE6F145D35E0}" type="presOf" srcId="{244EE17A-B3F9-495B-9E01-C01B9352C2A0}" destId="{9E1EFAB8-8D76-4115-B92A-45E6DD4E5EA6}" srcOrd="1" destOrd="0" presId="urn:microsoft.com/office/officeart/2005/8/layout/orgChart1"/>
-    <dgm:cxn modelId="{B5BDA5E3-E00F-4CC9-A2D2-6B1D5A6BE670}" srcId="{51FC4258-6D06-494F-91D0-050FBAAE2821}" destId="{244EE17A-B3F9-495B-9E01-C01B9352C2A0}" srcOrd="0" destOrd="0" parTransId="{FFA7DDD0-7E6D-485C-873E-08BCDFCE6512}" sibTransId="{CFC50FDF-712E-46A8-9E0E-4B21AB91301D}"/>
+    <dgm:cxn modelId="{1506DDD0-FE47-4C18-99A3-D50C1C8BE83A}" type="presOf" srcId="{E4646C87-1D5C-488E-A15A-8E32408C91C9}" destId="{CA4D75A4-41AD-41F7-B038-EA4733BE9432}" srcOrd="1" destOrd="0" presId="urn:microsoft.com/office/officeart/2005/8/layout/orgChart1"/>
+    <dgm:cxn modelId="{00A879CC-487A-4113-8BCA-4E49794933AC}" type="presOf" srcId="{1A9BF837-6F58-443B-A2EA-CC9579FF8901}" destId="{3E5BD639-6EFF-4F6A-B5BA-0A2013892613}" srcOrd="1" destOrd="0" presId="urn:microsoft.com/office/officeart/2005/8/layout/orgChart1"/>
+    <dgm:cxn modelId="{6640B9E6-3C1A-43B6-8E07-9E83EEAB3886}" type="presOf" srcId="{51FC4258-6D06-494F-91D0-050FBAAE2821}" destId="{6FA1F303-F81F-4086-8CA8-C5C45FB8D5DD}" srcOrd="1" destOrd="0" presId="urn:microsoft.com/office/officeart/2005/8/layout/orgChart1"/>
+    <dgm:cxn modelId="{223D2CEC-40FF-4DD7-A063-4C769A744038}" type="presOf" srcId="{41620FA9-438D-479B-BE8A-9241C7529B97}" destId="{37C0986C-7A4F-4D80-AB86-E1DF3A130412}" srcOrd="0" destOrd="0" presId="urn:microsoft.com/office/officeart/2005/8/layout/orgChart1"/>
+    <dgm:cxn modelId="{AF86FFA2-6D0D-4082-B031-0D7D5A3641A5}" srcId="{2992D994-0831-4186-B42F-5FB754E9E498}" destId="{51FC4258-6D06-494F-91D0-050FBAAE2821}" srcOrd="0" destOrd="0" parTransId="{4AB7D006-6848-4F84-BCDF-1001AC17D8D8}" sibTransId="{FB4ECDA2-7274-4EFD-B8B0-CA6429DFB7D0}"/>
+    <dgm:cxn modelId="{BB8B446D-9169-4195-8054-616EFF64B965}" srcId="{51FC4258-6D06-494F-91D0-050FBAAE2821}" destId="{1A9BF837-6F58-443B-A2EA-CC9579FF8901}" srcOrd="3" destOrd="0" parTransId="{59F28D88-5C53-4A09-BB17-FC7F6B8F9ABA}" sibTransId="{4C0DBC71-5E47-41D3-B719-23AD97A05620}"/>
+    <dgm:cxn modelId="{1DA36077-703A-44E9-BF10-60D0DC4D5031}" type="presOf" srcId="{2992D994-0831-4186-B42F-5FB754E9E498}" destId="{73D38206-EB39-40CF-9A3B-551DBA203F41}" srcOrd="0" destOrd="0" presId="urn:microsoft.com/office/officeart/2005/8/layout/orgChart1"/>
     <dgm:cxn modelId="{740756A3-00C1-4F4A-B6DC-E37C718AF4B0}" type="presOf" srcId="{FFA7DDD0-7E6D-485C-873E-08BCDFCE6512}" destId="{9724640F-F9F2-4781-89B9-B9EB9C9883A2}" srcOrd="0" destOrd="0" presId="urn:microsoft.com/office/officeart/2005/8/layout/orgChart1"/>
     <dgm:cxn modelId="{0440CD5E-AB5C-44DA-9233-1D76214DE653}" srcId="{51FC4258-6D06-494F-91D0-050FBAAE2821}" destId="{2B794F19-BBB4-40AE-8A02-005AF312B0CB}" srcOrd="1" destOrd="0" parTransId="{41620FA9-438D-479B-BE8A-9241C7529B97}" sibTransId="{BF6DB499-D8FD-4434-9E19-42D8981326F4}"/>
+    <dgm:cxn modelId="{FF362330-928F-4AD5-8D95-E2408ECDD2FD}" type="presOf" srcId="{E4646C87-1D5C-488E-A15A-8E32408C91C9}" destId="{EC0D1E2C-77F3-46FF-84D8-9F34BF30D0DB}" srcOrd="0" destOrd="0" presId="urn:microsoft.com/office/officeart/2005/8/layout/orgChart1"/>
+    <dgm:cxn modelId="{F2942F07-8925-4CC9-90C0-46A11CF03B7A}" type="presOf" srcId="{59F28D88-5C53-4A09-BB17-FC7F6B8F9ABA}" destId="{BB82E3A6-21E2-4321-BBF7-995CFA742628}" srcOrd="0" destOrd="0" presId="urn:microsoft.com/office/officeart/2005/8/layout/orgChart1"/>
+    <dgm:cxn modelId="{73404C83-17E3-490D-8B5A-DE6F145D35E0}" type="presOf" srcId="{244EE17A-B3F9-495B-9E01-C01B9352C2A0}" destId="{9E1EFAB8-8D76-4115-B92A-45E6DD4E5EA6}" srcOrd="1" destOrd="0" presId="urn:microsoft.com/office/officeart/2005/8/layout/orgChart1"/>
+    <dgm:cxn modelId="{8FA46886-A422-478F-8953-572A60995862}" type="presOf" srcId="{2B794F19-BBB4-40AE-8A02-005AF312B0CB}" destId="{234A27DB-36A9-4447-A301-7454150C07B6}" srcOrd="0" destOrd="0" presId="urn:microsoft.com/office/officeart/2005/8/layout/orgChart1"/>
+    <dgm:cxn modelId="{C12E1252-CDA1-4826-8241-678061B2BE29}" type="presOf" srcId="{EF65000C-2AD1-426C-8C60-A38915C1E6A8}" destId="{3C78C002-1AC3-41B3-89E0-321DB83FE365}" srcOrd="0" destOrd="0" presId="urn:microsoft.com/office/officeart/2005/8/layout/orgChart1"/>
     <dgm:cxn modelId="{90919E10-F34D-4839-9C2D-F453539D88F8}" type="presOf" srcId="{244EE17A-B3F9-495B-9E01-C01B9352C2A0}" destId="{809594D5-42AB-48C3-B007-ED5329F84148}" srcOrd="0" destOrd="0" presId="urn:microsoft.com/office/officeart/2005/8/layout/orgChart1"/>
-    <dgm:cxn modelId="{223D2CEC-40FF-4DD7-A063-4C769A744038}" type="presOf" srcId="{41620FA9-438D-479B-BE8A-9241C7529B97}" destId="{37C0986C-7A4F-4D80-AB86-E1DF3A130412}" srcOrd="0" destOrd="0" presId="urn:microsoft.com/office/officeart/2005/8/layout/orgChart1"/>
-    <dgm:cxn modelId="{1DA36077-703A-44E9-BF10-60D0DC4D5031}" type="presOf" srcId="{2992D994-0831-4186-B42F-5FB754E9E498}" destId="{73D38206-EB39-40CF-9A3B-551DBA203F41}" srcOrd="0" destOrd="0" presId="urn:microsoft.com/office/officeart/2005/8/layout/orgChart1"/>
-    <dgm:cxn modelId="{C12E1252-CDA1-4826-8241-678061B2BE29}" type="presOf" srcId="{EF65000C-2AD1-426C-8C60-A38915C1E6A8}" destId="{3C78C002-1AC3-41B3-89E0-321DB83FE365}" srcOrd="0" destOrd="0" presId="urn:microsoft.com/office/officeart/2005/8/layout/orgChart1"/>
-    <dgm:cxn modelId="{00A879CC-487A-4113-8BCA-4E49794933AC}" type="presOf" srcId="{1A9BF837-6F58-443B-A2EA-CC9579FF8901}" destId="{3E5BD639-6EFF-4F6A-B5BA-0A2013892613}" srcOrd="1" destOrd="0" presId="urn:microsoft.com/office/officeart/2005/8/layout/orgChart1"/>
-    <dgm:cxn modelId="{1506DDD0-FE47-4C18-99A3-D50C1C8BE83A}" type="presOf" srcId="{E4646C87-1D5C-488E-A15A-8E32408C91C9}" destId="{CA4D75A4-41AD-41F7-B038-EA4733BE9432}" srcOrd="1" destOrd="0" presId="urn:microsoft.com/office/officeart/2005/8/layout/orgChart1"/>
-    <dgm:cxn modelId="{FF362330-928F-4AD5-8D95-E2408ECDD2FD}" type="presOf" srcId="{E4646C87-1D5C-488E-A15A-8E32408C91C9}" destId="{EC0D1E2C-77F3-46FF-84D8-9F34BF30D0DB}" srcOrd="0" destOrd="0" presId="urn:microsoft.com/office/officeart/2005/8/layout/orgChart1"/>
+    <dgm:cxn modelId="{52D74390-1A9B-4077-AB3F-5541CBC92BF6}" type="presOf" srcId="{51FC4258-6D06-494F-91D0-050FBAAE2821}" destId="{60FACEAF-2A4B-4F0B-BCDC-B97101F53B65}" srcOrd="0" destOrd="0" presId="urn:microsoft.com/office/officeart/2005/8/layout/orgChart1"/>
+    <dgm:cxn modelId="{CA58696D-1268-4EA4-A96D-79E746BCCEFB}" srcId="{51FC4258-6D06-494F-91D0-050FBAAE2821}" destId="{E4646C87-1D5C-488E-A15A-8E32408C91C9}" srcOrd="2" destOrd="0" parTransId="{EF65000C-2AD1-426C-8C60-A38915C1E6A8}" sibTransId="{38942D74-3F53-47FA-880A-D4A116972DB2}"/>
     <dgm:cxn modelId="{74677EB2-B0AA-4675-B661-AFE8C12DEB18}" type="presOf" srcId="{2B794F19-BBB4-40AE-8A02-005AF312B0CB}" destId="{AB3EBC11-6228-41FC-943A-1EC28CAE4BCA}" srcOrd="1" destOrd="0" presId="urn:microsoft.com/office/officeart/2005/8/layout/orgChart1"/>
-    <dgm:cxn modelId="{AF86FFA2-6D0D-4082-B031-0D7D5A3641A5}" srcId="{2992D994-0831-4186-B42F-5FB754E9E498}" destId="{51FC4258-6D06-494F-91D0-050FBAAE2821}" srcOrd="0" destOrd="0" parTransId="{4AB7D006-6848-4F84-BCDF-1001AC17D8D8}" sibTransId="{FB4ECDA2-7274-4EFD-B8B0-CA6429DFB7D0}"/>
-    <dgm:cxn modelId="{BB8B446D-9169-4195-8054-616EFF64B965}" srcId="{51FC4258-6D06-494F-91D0-050FBAAE2821}" destId="{1A9BF837-6F58-443B-A2EA-CC9579FF8901}" srcOrd="3" destOrd="0" parTransId="{59F28D88-5C53-4A09-BB17-FC7F6B8F9ABA}" sibTransId="{4C0DBC71-5E47-41D3-B719-23AD97A05620}"/>
-    <dgm:cxn modelId="{8FA46886-A422-478F-8953-572A60995862}" type="presOf" srcId="{2B794F19-BBB4-40AE-8A02-005AF312B0CB}" destId="{234A27DB-36A9-4447-A301-7454150C07B6}" srcOrd="0" destOrd="0" presId="urn:microsoft.com/office/officeart/2005/8/layout/orgChart1"/>
-    <dgm:cxn modelId="{6640B9E6-3C1A-43B6-8E07-9E83EEAB3886}" type="presOf" srcId="{51FC4258-6D06-494F-91D0-050FBAAE2821}" destId="{6FA1F303-F81F-4086-8CA8-C5C45FB8D5DD}" srcOrd="1" destOrd="0" presId="urn:microsoft.com/office/officeart/2005/8/layout/orgChart1"/>
-    <dgm:cxn modelId="{F2942F07-8925-4CC9-90C0-46A11CF03B7A}" type="presOf" srcId="{59F28D88-5C53-4A09-BB17-FC7F6B8F9ABA}" destId="{BB82E3A6-21E2-4321-BBF7-995CFA742628}" srcOrd="0" destOrd="0" presId="urn:microsoft.com/office/officeart/2005/8/layout/orgChart1"/>
-    <dgm:cxn modelId="{52D74390-1A9B-4077-AB3F-5541CBC92BF6}" type="presOf" srcId="{51FC4258-6D06-494F-91D0-050FBAAE2821}" destId="{60FACEAF-2A4B-4F0B-BCDC-B97101F53B65}" srcOrd="0" destOrd="0" presId="urn:microsoft.com/office/officeart/2005/8/layout/orgChart1"/>
     <dgm:cxn modelId="{DA751E37-56AC-424D-BBF4-BB82EA01757C}" type="presOf" srcId="{1A9BF837-6F58-443B-A2EA-CC9579FF8901}" destId="{99995B44-FB4D-4521-895D-42A906C789F2}" srcOrd="0" destOrd="0" presId="urn:microsoft.com/office/officeart/2005/8/layout/orgChart1"/>
-    <dgm:cxn modelId="{CA58696D-1268-4EA4-A96D-79E746BCCEFB}" srcId="{51FC4258-6D06-494F-91D0-050FBAAE2821}" destId="{E4646C87-1D5C-488E-A15A-8E32408C91C9}" srcOrd="2" destOrd="0" parTransId="{EF65000C-2AD1-426C-8C60-A38915C1E6A8}" sibTransId="{38942D74-3F53-47FA-880A-D4A116972DB2}"/>
+    <dgm:cxn modelId="{B5BDA5E3-E00F-4CC9-A2D2-6B1D5A6BE670}" srcId="{51FC4258-6D06-494F-91D0-050FBAAE2821}" destId="{244EE17A-B3F9-495B-9E01-C01B9352C2A0}" srcOrd="0" destOrd="0" parTransId="{FFA7DDD0-7E6D-485C-873E-08BCDFCE6512}" sibTransId="{CFC50FDF-712E-46A8-9E0E-4B21AB91301D}"/>
     <dgm:cxn modelId="{9CD69AAE-8A0F-40AE-B1A3-27910EB92D28}" type="presParOf" srcId="{73D38206-EB39-40CF-9A3B-551DBA203F41}" destId="{36FC6E05-4100-4145-9EBC-BA82AA18A8E6}" srcOrd="0" destOrd="0" presId="urn:microsoft.com/office/officeart/2005/8/layout/orgChart1"/>
     <dgm:cxn modelId="{4FC588D0-6593-445A-8199-5E39F0B25DF6}" type="presParOf" srcId="{36FC6E05-4100-4145-9EBC-BA82AA18A8E6}" destId="{AA56CCD4-AD31-4915-B8AB-19DBF64E4A44}" srcOrd="0" destOrd="0" presId="urn:microsoft.com/office/officeart/2005/8/layout/orgChart1"/>
     <dgm:cxn modelId="{F17391C9-2C69-47C8-B42D-1F920E8F3447}" type="presParOf" srcId="{AA56CCD4-AD31-4915-B8AB-19DBF64E4A44}" destId="{60FACEAF-2A4B-4F0B-BCDC-B97101F53B65}" srcOrd="0" destOrd="0" presId="urn:microsoft.com/office/officeart/2005/8/layout/orgChart1"/>
@@ -3291,7 +3075,7 @@
         </a:bodyPr>
         <a:lstStyle/>
         <a:p>
-          <a:pPr lvl="0" algn="ctr" defTabSz="933450">
+          <a:pPr marL="0" lvl="0" indent="0" algn="ctr" defTabSz="933450">
             <a:lnSpc>
               <a:spcPct val="90000"/>
             </a:lnSpc>
@@ -3301,14 +3085,15 @@
             <a:spcAft>
               <a:spcPct val="35000"/>
             </a:spcAft>
+            <a:buNone/>
           </a:pPr>
           <a:r>
-            <a:rPr lang="en-US" sz="2100" kern="1200" dirty="0" smtClean="0"/>
+            <a:rPr lang="en-US" sz="2100" kern="1200" dirty="0"/>
             <a:t>App</a:t>
           </a:r>
         </a:p>
         <a:p>
-          <a:pPr lvl="0" algn="ctr" defTabSz="933450">
+          <a:pPr marL="0" lvl="0" indent="0" algn="ctr" defTabSz="933450">
             <a:lnSpc>
               <a:spcPct val="90000"/>
             </a:lnSpc>
@@ -3318,9 +3103,10 @@
             <a:spcAft>
               <a:spcPct val="35000"/>
             </a:spcAft>
+            <a:buNone/>
           </a:pPr>
           <a:r>
-            <a:rPr lang="en-US" sz="1200" kern="1200" dirty="0" err="1" smtClean="0"/>
+            <a:rPr lang="en-US" sz="1200" kern="1200" dirty="0" err="1"/>
             <a:t>LogService</a:t>
           </a:r>
           <a:endParaRPr lang="en-US" sz="1200" kern="1200" dirty="0"/>
@@ -3379,7 +3165,7 @@
         </a:bodyPr>
         <a:lstStyle/>
         <a:p>
-          <a:pPr lvl="0" algn="ctr" defTabSz="889000">
+          <a:pPr marL="0" lvl="0" indent="0" algn="ctr" defTabSz="889000">
             <a:lnSpc>
               <a:spcPct val="90000"/>
             </a:lnSpc>
@@ -3389,12 +3175,12 @@
             <a:spcAft>
               <a:spcPct val="35000"/>
             </a:spcAft>
+            <a:buNone/>
           </a:pPr>
           <a:r>
-            <a:rPr lang="en-US" sz="2000" kern="1200" dirty="0" smtClean="0"/>
+            <a:rPr lang="en-US" sz="2000" kern="1200" dirty="0"/>
             <a:t>Detail</a:t>
           </a:r>
-          <a:endParaRPr lang="en-US" sz="2000" kern="1200" dirty="0"/>
         </a:p>
       </dsp:txBody>
       <dsp:txXfrm>
@@ -3450,7 +3236,7 @@
         </a:bodyPr>
         <a:lstStyle/>
         <a:p>
-          <a:pPr lvl="0" algn="ctr" defTabSz="889000">
+          <a:pPr marL="0" lvl="0" indent="0" algn="ctr" defTabSz="889000">
             <a:lnSpc>
               <a:spcPct val="90000"/>
             </a:lnSpc>
@@ -3460,12 +3246,12 @@
             <a:spcAft>
               <a:spcPct val="35000"/>
             </a:spcAft>
+            <a:buNone/>
           </a:pPr>
           <a:r>
-            <a:rPr lang="en-US" sz="2000" kern="1200" dirty="0" smtClean="0"/>
+            <a:rPr lang="en-US" sz="2000" kern="1200" dirty="0"/>
             <a:t>Review</a:t>
           </a:r>
-          <a:endParaRPr lang="en-US" sz="2000" kern="1200" dirty="0"/>
         </a:p>
       </dsp:txBody>
       <dsp:txXfrm>
@@ -3521,7 +3307,7 @@
         </a:bodyPr>
         <a:lstStyle/>
         <a:p>
-          <a:pPr lvl="0" algn="ctr" defTabSz="889000">
+          <a:pPr marL="0" lvl="0" indent="0" algn="ctr" defTabSz="889000">
             <a:lnSpc>
               <a:spcPct val="90000"/>
             </a:lnSpc>
@@ -3531,12 +3317,12 @@
             <a:spcAft>
               <a:spcPct val="35000"/>
             </a:spcAft>
+            <a:buNone/>
           </a:pPr>
           <a:r>
-            <a:rPr lang="en-US" sz="2000" kern="1200" dirty="0" smtClean="0"/>
+            <a:rPr lang="en-US" sz="2000" kern="1200" dirty="0"/>
             <a:t>Comment</a:t>
           </a:r>
-          <a:endParaRPr lang="en-US" sz="2000" kern="1200" dirty="0"/>
         </a:p>
       </dsp:txBody>
       <dsp:txXfrm>
@@ -3592,7 +3378,7 @@
         </a:bodyPr>
         <a:lstStyle/>
         <a:p>
-          <a:pPr lvl="0" algn="ctr" defTabSz="933450">
+          <a:pPr marL="0" lvl="0" indent="0" algn="ctr" defTabSz="933450">
             <a:lnSpc>
               <a:spcPct val="90000"/>
             </a:lnSpc>
@@ -3602,15 +3388,16 @@
             <a:spcAft>
               <a:spcPct val="35000"/>
             </a:spcAft>
+            <a:buNone/>
           </a:pPr>
           <a:r>
-            <a:rPr lang="en-US" sz="2100" kern="1200" dirty="0" err="1" smtClean="0"/>
+            <a:rPr lang="en-US" sz="2100" kern="1200" dirty="0" err="1"/>
             <a:t>MovieList</a:t>
           </a:r>
-          <a:endParaRPr lang="en-US" sz="2100" kern="1200" dirty="0" smtClean="0"/>
+          <a:endParaRPr lang="en-US" sz="2100" kern="1200" dirty="0"/>
         </a:p>
         <a:p>
-          <a:pPr lvl="0" algn="ctr" defTabSz="933450">
+          <a:pPr marL="0" lvl="0" indent="0" algn="ctr" defTabSz="933450">
             <a:lnSpc>
               <a:spcPct val="90000"/>
             </a:lnSpc>
@@ -3620,9 +3407,10 @@
             <a:spcAft>
               <a:spcPct val="35000"/>
             </a:spcAft>
+            <a:buNone/>
           </a:pPr>
           <a:r>
-            <a:rPr lang="en-US" sz="1200" kern="1200" dirty="0" err="1" smtClean="0"/>
+            <a:rPr lang="en-US" sz="1200" kern="1200" dirty="0" err="1"/>
             <a:t>MovieService</a:t>
           </a:r>
           <a:endParaRPr lang="en-US" sz="1200" kern="1200" dirty="0"/>
@@ -3928,7 +3716,7 @@
         </a:bodyPr>
         <a:lstStyle/>
         <a:p>
-          <a:pPr lvl="0" algn="ctr" defTabSz="933450">
+          <a:pPr marL="0" lvl="0" indent="0" algn="ctr" defTabSz="933450">
             <a:lnSpc>
               <a:spcPct val="90000"/>
             </a:lnSpc>
@@ -3938,14 +3726,15 @@
             <a:spcAft>
               <a:spcPct val="35000"/>
             </a:spcAft>
+            <a:buNone/>
           </a:pPr>
           <a:r>
-            <a:rPr lang="en-US" sz="2100" kern="1200" dirty="0" smtClean="0"/>
+            <a:rPr lang="en-US" sz="2100" kern="1200" dirty="0"/>
             <a:t>App</a:t>
           </a:r>
         </a:p>
         <a:p>
-          <a:pPr lvl="0" algn="ctr" defTabSz="933450">
+          <a:pPr marL="0" lvl="0" indent="0" algn="ctr" defTabSz="933450">
             <a:lnSpc>
               <a:spcPct val="90000"/>
             </a:lnSpc>
@@ -3955,9 +3744,10 @@
             <a:spcAft>
               <a:spcPct val="35000"/>
             </a:spcAft>
+            <a:buNone/>
           </a:pPr>
           <a:r>
-            <a:rPr lang="en-US" sz="1200" kern="1200" dirty="0" err="1" smtClean="0"/>
+            <a:rPr lang="en-US" sz="1200" kern="1200" dirty="0" err="1"/>
             <a:t>LogService</a:t>
           </a:r>
           <a:endParaRPr lang="en-US" sz="1200" kern="1200" dirty="0"/>
@@ -4016,7 +3806,7 @@
         </a:bodyPr>
         <a:lstStyle/>
         <a:p>
-          <a:pPr lvl="0" algn="ctr" defTabSz="889000">
+          <a:pPr marL="0" lvl="0" indent="0" algn="ctr" defTabSz="889000">
             <a:lnSpc>
               <a:spcPct val="90000"/>
             </a:lnSpc>
@@ -4026,12 +3816,12 @@
             <a:spcAft>
               <a:spcPct val="35000"/>
             </a:spcAft>
+            <a:buNone/>
           </a:pPr>
           <a:r>
-            <a:rPr lang="en-US" sz="2000" kern="1200" dirty="0" smtClean="0"/>
+            <a:rPr lang="en-US" sz="2000" kern="1200" dirty="0"/>
             <a:t>Detail</a:t>
           </a:r>
-          <a:endParaRPr lang="en-US" sz="2000" kern="1200" dirty="0"/>
         </a:p>
       </dsp:txBody>
       <dsp:txXfrm>
@@ -4087,7 +3877,7 @@
         </a:bodyPr>
         <a:lstStyle/>
         <a:p>
-          <a:pPr lvl="0" algn="ctr" defTabSz="889000">
+          <a:pPr marL="0" lvl="0" indent="0" algn="ctr" defTabSz="889000">
             <a:lnSpc>
               <a:spcPct val="90000"/>
             </a:lnSpc>
@@ -4097,12 +3887,12 @@
             <a:spcAft>
               <a:spcPct val="35000"/>
             </a:spcAft>
+            <a:buNone/>
           </a:pPr>
           <a:r>
-            <a:rPr lang="en-US" sz="2000" kern="1200" dirty="0" smtClean="0"/>
+            <a:rPr lang="en-US" sz="2000" kern="1200" dirty="0"/>
             <a:t>Review</a:t>
           </a:r>
-          <a:endParaRPr lang="en-US" sz="2000" kern="1200" dirty="0"/>
         </a:p>
       </dsp:txBody>
       <dsp:txXfrm>
@@ -4158,7 +3948,7 @@
         </a:bodyPr>
         <a:lstStyle/>
         <a:p>
-          <a:pPr lvl="0" algn="ctr" defTabSz="889000">
+          <a:pPr marL="0" lvl="0" indent="0" algn="ctr" defTabSz="889000">
             <a:lnSpc>
               <a:spcPct val="90000"/>
             </a:lnSpc>
@@ -4168,12 +3958,12 @@
             <a:spcAft>
               <a:spcPct val="35000"/>
             </a:spcAft>
+            <a:buNone/>
           </a:pPr>
           <a:r>
-            <a:rPr lang="en-US" sz="2000" kern="1200" dirty="0" smtClean="0"/>
+            <a:rPr lang="en-US" sz="2000" kern="1200" dirty="0"/>
             <a:t>Comment</a:t>
           </a:r>
-          <a:endParaRPr lang="en-US" sz="2000" kern="1200" dirty="0"/>
         </a:p>
       </dsp:txBody>
       <dsp:txXfrm>
@@ -4229,7 +4019,7 @@
         </a:bodyPr>
         <a:lstStyle/>
         <a:p>
-          <a:pPr lvl="0" algn="ctr" defTabSz="933450">
+          <a:pPr marL="0" lvl="0" indent="0" algn="ctr" defTabSz="933450">
             <a:lnSpc>
               <a:spcPct val="90000"/>
             </a:lnSpc>
@@ -4239,15 +4029,16 @@
             <a:spcAft>
               <a:spcPct val="35000"/>
             </a:spcAft>
+            <a:buNone/>
           </a:pPr>
           <a:r>
-            <a:rPr lang="en-US" sz="2100" kern="1200" dirty="0" err="1" smtClean="0"/>
+            <a:rPr lang="en-US" sz="2100" kern="1200" dirty="0" err="1"/>
             <a:t>MovieList</a:t>
           </a:r>
-          <a:endParaRPr lang="en-US" sz="2100" kern="1200" dirty="0" smtClean="0"/>
+          <a:endParaRPr lang="en-US" sz="2100" kern="1200" dirty="0"/>
         </a:p>
         <a:p>
-          <a:pPr lvl="0" algn="ctr" defTabSz="933450">
+          <a:pPr marL="0" lvl="0" indent="0" algn="ctr" defTabSz="933450">
             <a:lnSpc>
               <a:spcPct val="90000"/>
             </a:lnSpc>
@@ -4257,9 +4048,10 @@
             <a:spcAft>
               <a:spcPct val="35000"/>
             </a:spcAft>
+            <a:buNone/>
           </a:pPr>
           <a:r>
-            <a:rPr lang="en-US" sz="1200" kern="1200" dirty="0" err="1" smtClean="0"/>
+            <a:rPr lang="en-US" sz="1200" kern="1200" dirty="0" err="1"/>
             <a:t>MovieService</a:t>
           </a:r>
           <a:endParaRPr lang="en-US" sz="1200" kern="1200" dirty="0"/>
@@ -8725,7 +8517,7 @@
               <a:pPr>
                 <a:defRPr/>
               </a:pPr>
-              <a:t>1/12/2016</a:t>
+              <a:t>7/28/2016</a:t>
             </a:fld>
             <a:endParaRPr lang="en-US"/>
           </a:p>
@@ -8999,35 +8791,35 @@
           <a:p>
             <a:pPr lvl="0"/>
             <a:r>
-              <a:rPr lang="en-US" noProof="0" smtClean="0"/>
+              <a:rPr lang="en-US" noProof="0"/>
               <a:t>Click to edit Master text styles</a:t>
             </a:r>
           </a:p>
           <a:p>
             <a:pPr lvl="1"/>
             <a:r>
-              <a:rPr lang="en-US" noProof="0" smtClean="0"/>
+              <a:rPr lang="en-US" noProof="0"/>
               <a:t>Second level</a:t>
             </a:r>
           </a:p>
           <a:p>
             <a:pPr lvl="2"/>
             <a:r>
-              <a:rPr lang="en-US" noProof="0" smtClean="0"/>
+              <a:rPr lang="en-US" noProof="0"/>
               <a:t>Third level</a:t>
             </a:r>
           </a:p>
           <a:p>
             <a:pPr lvl="3"/>
             <a:r>
-              <a:rPr lang="en-US" noProof="0" smtClean="0"/>
+              <a:rPr lang="en-US" noProof="0"/>
               <a:t>Fourth level</a:t>
             </a:r>
           </a:p>
           <a:p>
             <a:pPr lvl="4"/>
             <a:r>
-              <a:rPr lang="en-US" noProof="0" smtClean="0"/>
+              <a:rPr lang="en-US" noProof="0"/>
               <a:t>Fifth level</a:t>
             </a:r>
           </a:p>
@@ -9308,7 +9100,7 @@
               <a:pPr/>
               <a:t>1</a:t>
             </a:fld>
-            <a:endParaRPr lang="en-US" smtClean="0"/>
+            <a:endParaRPr lang="en-US"/>
           </a:p>
         </p:txBody>
       </p:sp>
@@ -9349,7 +9141,7 @@
           <a:lstStyle/>
           <a:p>
             <a:pPr eaLnBrk="1" hangingPunct="1"/>
-            <a:endParaRPr lang="en-US" smtClean="0"/>
+            <a:endParaRPr lang="en-US"/>
           </a:p>
         </p:txBody>
       </p:sp>
@@ -9412,7 +9204,7 @@
           </a:lstStyle>
           <a:p>
             <a:r>
-              <a:rPr lang="en-US" smtClean="0"/>
+              <a:rPr lang="en-US"/>
               <a:t>Click to edit Master title style</a:t>
             </a:r>
             <a:endParaRPr lang="en-US" dirty="0"/>
@@ -9448,7 +9240,7 @@
           </a:lstStyle>
           <a:p>
             <a:r>
-              <a:rPr lang="en-US" smtClean="0"/>
+              <a:rPr lang="en-US"/>
               <a:t>Click to edit Master subtitle style</a:t>
             </a:r>
             <a:endParaRPr lang="en-US" dirty="0"/>
@@ -9536,7 +9328,7 @@
           </a:lstStyle>
           <a:p>
             <a:r>
-              <a:rPr lang="en-US" smtClean="0"/>
+              <a:rPr lang="en-US"/>
               <a:t>Click to edit Master title style</a:t>
             </a:r>
             <a:endParaRPr lang="en-US" dirty="0"/>
@@ -9601,35 +9393,35 @@
           <a:p>
             <a:pPr lvl="0"/>
             <a:r>
-              <a:rPr lang="en-US" smtClean="0"/>
+              <a:rPr lang="en-US"/>
               <a:t>Click to edit Master text styles</a:t>
             </a:r>
           </a:p>
           <a:p>
             <a:pPr lvl="1"/>
             <a:r>
-              <a:rPr lang="en-US" smtClean="0"/>
+              <a:rPr lang="en-US"/>
               <a:t>Second level</a:t>
             </a:r>
           </a:p>
           <a:p>
             <a:pPr lvl="2"/>
             <a:r>
-              <a:rPr lang="en-US" smtClean="0"/>
+              <a:rPr lang="en-US"/>
               <a:t>Third level</a:t>
             </a:r>
           </a:p>
           <a:p>
             <a:pPr lvl="3"/>
             <a:r>
-              <a:rPr lang="en-US" smtClean="0"/>
+              <a:rPr lang="en-US"/>
               <a:t>Fourth level</a:t>
             </a:r>
           </a:p>
           <a:p>
             <a:pPr lvl="4"/>
             <a:r>
-              <a:rPr lang="en-US" smtClean="0"/>
+              <a:rPr lang="en-US"/>
               <a:t>Fifth level</a:t>
             </a:r>
             <a:endParaRPr lang="en-US" dirty="0"/>
@@ -9693,10 +9485,9 @@
           </a:lstStyle>
           <a:p>
             <a:r>
-              <a:rPr lang="en-US" dirty="0" smtClean="0"/>
+              <a:rPr lang="en-US" dirty="0"/>
               <a:t>References</a:t>
             </a:r>
-            <a:endParaRPr lang="en-US" dirty="0"/>
           </a:p>
         </p:txBody>
       </p:sp>
@@ -9758,35 +9549,35 @@
           <a:p>
             <a:pPr lvl="0"/>
             <a:r>
-              <a:rPr lang="en-US" smtClean="0"/>
+              <a:rPr lang="en-US"/>
               <a:t>Click to edit Master text styles</a:t>
             </a:r>
           </a:p>
           <a:p>
             <a:pPr lvl="1"/>
             <a:r>
-              <a:rPr lang="en-US" smtClean="0"/>
+              <a:rPr lang="en-US"/>
               <a:t>Second level</a:t>
             </a:r>
           </a:p>
           <a:p>
             <a:pPr lvl="2"/>
             <a:r>
-              <a:rPr lang="en-US" smtClean="0"/>
+              <a:rPr lang="en-US"/>
               <a:t>Third level</a:t>
             </a:r>
           </a:p>
           <a:p>
             <a:pPr lvl="3"/>
             <a:r>
-              <a:rPr lang="en-US" smtClean="0"/>
+              <a:rPr lang="en-US"/>
               <a:t>Fourth level</a:t>
             </a:r>
           </a:p>
           <a:p>
             <a:pPr lvl="4"/>
             <a:r>
-              <a:rPr lang="en-US" smtClean="0"/>
+              <a:rPr lang="en-US"/>
               <a:t>Fifth level</a:t>
             </a:r>
             <a:endParaRPr lang="en-US" dirty="0"/>
@@ -9842,10 +9633,9 @@
           <a:lstStyle/>
           <a:p>
             <a:r>
-              <a:rPr lang="en-US" smtClean="0"/>
+              <a:rPr lang="en-US"/>
               <a:t>Click to edit Master title style</a:t>
             </a:r>
-            <a:endParaRPr lang="en-US"/>
           </a:p>
         </p:txBody>
       </p:sp>
@@ -9886,7 +9676,7 @@
           <a:p>
             <a:pPr lvl="0"/>
             <a:r>
-              <a:rPr lang="en-US" smtClean="0"/>
+              <a:rPr lang="en-US"/>
               <a:t>Click to edit Master text styles</a:t>
             </a:r>
           </a:p>
@@ -9941,10 +9731,9 @@
           <a:lstStyle/>
           <a:p>
             <a:r>
-              <a:rPr lang="en-US" smtClean="0"/>
+              <a:rPr lang="en-US"/>
               <a:t>Click to edit Master title style</a:t>
             </a:r>
-            <a:endParaRPr lang="en-US"/>
           </a:p>
         </p:txBody>
       </p:sp>
@@ -9997,10 +9786,9 @@
           <a:lstStyle/>
           <a:p>
             <a:r>
-              <a:rPr lang="en-US" smtClean="0"/>
+              <a:rPr lang="en-US"/>
               <a:t>Click to edit Master title style</a:t>
             </a:r>
-            <a:endParaRPr lang="en-US"/>
           </a:p>
         </p:txBody>
       </p:sp>
@@ -10041,7 +9829,7 @@
           <a:p>
             <a:pPr lvl="0"/>
             <a:r>
-              <a:rPr lang="en-US" smtClean="0"/>
+              <a:rPr lang="en-US"/>
               <a:t>Click to edit Master text styles</a:t>
             </a:r>
           </a:p>
@@ -10091,10 +9879,9 @@
           <a:lstStyle/>
           <a:p>
             <a:r>
-              <a:rPr lang="en-US" smtClean="0"/>
+              <a:rPr lang="en-US"/>
               <a:t>Click to edit Master title style</a:t>
             </a:r>
-            <a:endParaRPr lang="en-US"/>
           </a:p>
         </p:txBody>
       </p:sp>
@@ -10170,35 +9957,35 @@
           <a:p>
             <a:pPr lvl="0"/>
             <a:r>
-              <a:rPr lang="en-US" smtClean="0"/>
+              <a:rPr lang="en-US"/>
               <a:t>Click to edit Master text styles</a:t>
             </a:r>
           </a:p>
           <a:p>
             <a:pPr lvl="1"/>
             <a:r>
-              <a:rPr lang="en-US" smtClean="0"/>
+              <a:rPr lang="en-US"/>
               <a:t>Second level</a:t>
             </a:r>
           </a:p>
           <a:p>
             <a:pPr lvl="2"/>
             <a:r>
-              <a:rPr lang="en-US" smtClean="0"/>
+              <a:rPr lang="en-US"/>
               <a:t>Third level</a:t>
             </a:r>
           </a:p>
           <a:p>
             <a:pPr lvl="3"/>
             <a:r>
-              <a:rPr lang="en-US" smtClean="0"/>
+              <a:rPr lang="en-US"/>
               <a:t>Fourth level</a:t>
             </a:r>
           </a:p>
           <a:p>
             <a:pPr lvl="4"/>
             <a:r>
-              <a:rPr lang="en-US" smtClean="0"/>
+              <a:rPr lang="en-US"/>
               <a:t>Fifth level</a:t>
             </a:r>
           </a:p>
@@ -10240,7 +10027,7 @@
           <a:p>
             <a:pPr lvl="0"/>
             <a:r>
-              <a:rPr lang="en-US" smtClean="0"/>
+              <a:rPr lang="en-US"/>
               <a:t>Click to edit Master title style</a:t>
             </a:r>
           </a:p>
@@ -10851,7 +10638,7 @@
           <a:p>
             <a:pPr defTabSz="914400" eaLnBrk="1" hangingPunct="1"/>
             <a:r>
-              <a:rPr lang="en-US" sz="3200" dirty="0" smtClean="0"/>
+              <a:rPr lang="en-US" sz="3200" dirty="0"/>
               <a:t>Services &amp; Dependency Injection</a:t>
             </a:r>
           </a:p>
@@ -10859,11 +10646,7 @@
             <a:pPr defTabSz="914400" eaLnBrk="1" hangingPunct="1"/>
             <a:r>
               <a:rPr lang="en-US" dirty="0"/>
-              <a:t>p</a:t>
-            </a:r>
-            <a:r>
-              <a:rPr lang="en-US" dirty="0" smtClean="0"/>
-              <a:t>rovide(service)</a:t>
+              <a:t>provide(service)</a:t>
             </a:r>
           </a:p>
         </p:txBody>
@@ -10917,13 +10700,6 @@
   <p:transition>
     <p:fade/>
   </p:transition>
-  <p:timing>
-    <p:tnLst>
-      <p:par>
-        <p:cTn id="1" dur="indefinite" restart="never" nodeType="tmRoot"/>
-      </p:par>
-    </p:tnLst>
-  </p:timing>
 </p:sld>
 </file>
 
@@ -10960,10 +10736,9 @@
           <a:lstStyle/>
           <a:p>
             <a:r>
-              <a:rPr lang="en-US" dirty="0" smtClean="0"/>
+              <a:rPr lang="en-US" dirty="0"/>
               <a:t>Factories</a:t>
             </a:r>
-            <a:endParaRPr lang="en-US" dirty="0"/>
           </a:p>
         </p:txBody>
       </p:sp>
@@ -10983,17 +10758,16 @@
           <a:lstStyle/>
           <a:p>
             <a:r>
-              <a:rPr lang="en-US" dirty="0" smtClean="0"/>
+              <a:rPr lang="en-US" dirty="0"/>
               <a:t>Take control of the service creation</a:t>
             </a:r>
           </a:p>
           <a:p>
             <a:pPr lvl="1"/>
             <a:r>
-              <a:rPr lang="en-US" dirty="0" smtClean="0"/>
+              <a:rPr lang="en-US" dirty="0"/>
               <a:t>Can specify dependencies with the “deps” property</a:t>
             </a:r>
-            <a:endParaRPr lang="en-US" dirty="0"/>
           </a:p>
         </p:txBody>
       </p:sp>
@@ -11034,13 +10808,6 @@
   <p:transition>
     <p:fade/>
   </p:transition>
-  <p:timing>
-    <p:tnLst>
-      <p:par>
-        <p:cTn id="1" dur="indefinite" restart="never" nodeType="tmRoot"/>
-      </p:par>
-    </p:tnLst>
-  </p:timing>
 </p:sld>
 </file>
 
@@ -11077,10 +10844,9 @@
           <a:lstStyle/>
           <a:p>
             <a:r>
-              <a:rPr lang="en-US" dirty="0" smtClean="0"/>
+              <a:rPr lang="en-US" dirty="0"/>
               <a:t>Values</a:t>
             </a:r>
-            <a:endParaRPr lang="en-US" dirty="0"/>
           </a:p>
         </p:txBody>
       </p:sp>
@@ -11100,30 +10866,29 @@
           <a:lstStyle/>
           <a:p>
             <a:r>
-              <a:rPr lang="en-US" dirty="0" smtClean="0"/>
+              <a:rPr lang="en-US" dirty="0"/>
               <a:t>Useful for configuration values</a:t>
             </a:r>
           </a:p>
           <a:p>
             <a:pPr lvl="1"/>
             <a:r>
-              <a:rPr lang="en-US" dirty="0" smtClean="0"/>
+              <a:rPr lang="en-US" dirty="0"/>
               <a:t>Paths</a:t>
             </a:r>
           </a:p>
           <a:p>
             <a:pPr lvl="1"/>
             <a:r>
-              <a:rPr lang="en-US" dirty="0" smtClean="0"/>
+              <a:rPr lang="en-US" dirty="0"/>
               <a:t>Magic numbers</a:t>
             </a:r>
           </a:p>
           <a:p>
             <a:r>
-              <a:rPr lang="en-US" dirty="0" smtClean="0"/>
+              <a:rPr lang="en-US" dirty="0"/>
               <a:t>Also can register existing instance of a service</a:t>
             </a:r>
-            <a:endParaRPr lang="en-US" dirty="0"/>
           </a:p>
         </p:txBody>
       </p:sp>
@@ -11164,13 +10929,6 @@
   <p:transition>
     <p:fade/>
   </p:transition>
-  <p:timing>
-    <p:tnLst>
-      <p:par>
-        <p:cTn id="1" dur="indefinite" restart="never" nodeType="tmRoot"/>
-      </p:par>
-    </p:tnLst>
-  </p:timing>
 </p:sld>
 </file>
 
@@ -11207,10 +10965,9 @@
           <a:lstStyle/>
           <a:p>
             <a:r>
-              <a:rPr lang="en-US" dirty="0" smtClean="0"/>
+              <a:rPr lang="en-US" dirty="0"/>
               <a:t>Hierarchy</a:t>
             </a:r>
-            <a:endParaRPr lang="en-US" dirty="0"/>
           </a:p>
         </p:txBody>
       </p:sp>
@@ -11230,24 +10987,23 @@
           <a:lstStyle/>
           <a:p>
             <a:r>
-              <a:rPr lang="en-US" dirty="0" smtClean="0"/>
+              <a:rPr lang="en-US" dirty="0"/>
               <a:t>Injectors follow the component hierarchy</a:t>
             </a:r>
           </a:p>
           <a:p>
             <a:pPr lvl="1"/>
             <a:r>
-              <a:rPr lang="en-US" dirty="0" smtClean="0"/>
+              <a:rPr lang="en-US" dirty="0"/>
               <a:t>Providers create new instances for current and child components</a:t>
             </a:r>
           </a:p>
           <a:p>
             <a:pPr lvl="1"/>
             <a:r>
-              <a:rPr lang="en-US" dirty="0" smtClean="0"/>
+              <a:rPr lang="en-US" dirty="0"/>
               <a:t>Child injectors search up the tree</a:t>
             </a:r>
-            <a:endParaRPr lang="en-US" dirty="0"/>
           </a:p>
         </p:txBody>
       </p:sp>
@@ -11286,13 +11042,6 @@
   <p:transition>
     <p:fade/>
   </p:transition>
-  <p:timing>
-    <p:tnLst>
-      <p:par>
-        <p:cTn id="1" dur="indefinite" restart="never" nodeType="tmRoot"/>
-      </p:par>
-    </p:tnLst>
-  </p:timing>
 </p:sld>
 </file>
 
@@ -11329,10 +11078,9 @@
           <a:lstStyle/>
           <a:p>
             <a:r>
-              <a:rPr lang="en-US" dirty="0" smtClean="0"/>
+              <a:rPr lang="en-US" dirty="0"/>
               <a:t>Http</a:t>
             </a:r>
-            <a:endParaRPr lang="en-US" dirty="0"/>
           </a:p>
         </p:txBody>
       </p:sp>
@@ -11352,24 +11100,24 @@
           <a:lstStyle/>
           <a:p>
             <a:r>
-              <a:rPr lang="en-US" dirty="0" smtClean="0"/>
+              <a:rPr lang="en-US" dirty="0"/>
               <a:t>Makes HTTP requests</a:t>
             </a:r>
           </a:p>
           <a:p>
             <a:pPr lvl="1"/>
             <a:r>
-              <a:rPr lang="en-US" dirty="0" smtClean="0"/>
+              <a:rPr lang="en-US" dirty="0"/>
               <a:t>get, put, post, delete</a:t>
             </a:r>
           </a:p>
           <a:p>
             <a:r>
-              <a:rPr lang="en-US" dirty="0" smtClean="0"/>
+              <a:rPr lang="en-US" dirty="0"/>
               <a:t>Returns an Observable from </a:t>
             </a:r>
             <a:r>
-              <a:rPr lang="en-US" dirty="0" err="1" smtClean="0"/>
+              <a:rPr lang="en-US" dirty="0" err="1"/>
               <a:t>RxJs</a:t>
             </a:r>
             <a:endParaRPr lang="en-US" dirty="0"/>
@@ -11400,30 +11148,6 @@
           </a:prstGeom>
         </p:spPr>
       </p:pic>
-      <p:pic>
-        <p:nvPicPr>
-          <p:cNvPr id="5" name="Picture 4"/>
-          <p:cNvPicPr>
-            <a:picLocks noChangeAspect="1"/>
-          </p:cNvPicPr>
-          <p:nvPr/>
-        </p:nvPicPr>
-        <p:blipFill>
-          <a:blip r:embed="rId3"/>
-          <a:stretch>
-            <a:fillRect/>
-          </a:stretch>
-        </p:blipFill>
-        <p:spPr>
-          <a:xfrm>
-            <a:off x="4500562" y="5091112"/>
-            <a:ext cx="3162300" cy="333375"/>
-          </a:xfrm>
-          <a:prstGeom prst="rect">
-            <a:avLst/>
-          </a:prstGeom>
-        </p:spPr>
-      </p:pic>
     </p:spTree>
     <p:extLst>
       <p:ext uri="{BB962C8B-B14F-4D97-AF65-F5344CB8AC3E}">
@@ -11437,89 +11161,6 @@
   <p:transition>
     <p:fade/>
   </p:transition>
-  <p:timing>
-    <p:tnLst>
-      <p:par>
-        <p:cTn id="1" dur="indefinite" restart="never" nodeType="tmRoot">
-          <p:childTnLst>
-            <p:seq concurrent="1" nextAc="seek">
-              <p:cTn id="2" dur="indefinite" nodeType="mainSeq">
-                <p:childTnLst>
-                  <p:par>
-                    <p:cTn id="3" fill="hold">
-                      <p:stCondLst>
-                        <p:cond delay="indefinite"/>
-                      </p:stCondLst>
-                      <p:childTnLst>
-                        <p:par>
-                          <p:cTn id="4" fill="hold">
-                            <p:stCondLst>
-                              <p:cond delay="0"/>
-                            </p:stCondLst>
-                            <p:childTnLst>
-                              <p:par>
-                                <p:cTn id="5" presetID="10" presetClass="entr" presetSubtype="0" fill="hold" nodeType="clickEffect">
-                                  <p:stCondLst>
-                                    <p:cond delay="0"/>
-                                  </p:stCondLst>
-                                  <p:childTnLst>
-                                    <p:set>
-                                      <p:cBhvr>
-                                        <p:cTn id="6" dur="1" fill="hold">
-                                          <p:stCondLst>
-                                            <p:cond delay="0"/>
-                                          </p:stCondLst>
-                                        </p:cTn>
-                                        <p:tgtEl>
-                                          <p:spTgt spid="5"/>
-                                        </p:tgtEl>
-                                        <p:attrNameLst>
-                                          <p:attrName>style.visibility</p:attrName>
-                                        </p:attrNameLst>
-                                      </p:cBhvr>
-                                      <p:to>
-                                        <p:strVal val="visible"/>
-                                      </p:to>
-                                    </p:set>
-                                    <p:animEffect transition="in" filter="fade">
-                                      <p:cBhvr>
-                                        <p:cTn id="7" dur="500"/>
-                                        <p:tgtEl>
-                                          <p:spTgt spid="5"/>
-                                        </p:tgtEl>
-                                      </p:cBhvr>
-                                    </p:animEffect>
-                                  </p:childTnLst>
-                                </p:cTn>
-                              </p:par>
-                            </p:childTnLst>
-                          </p:cTn>
-                        </p:par>
-                      </p:childTnLst>
-                    </p:cTn>
-                  </p:par>
-                </p:childTnLst>
-              </p:cTn>
-              <p:prevCondLst>
-                <p:cond evt="onPrev" delay="0">
-                  <p:tgtEl>
-                    <p:sldTgt/>
-                  </p:tgtEl>
-                </p:cond>
-              </p:prevCondLst>
-              <p:nextCondLst>
-                <p:cond evt="onNext" delay="0">
-                  <p:tgtEl>
-                    <p:sldTgt/>
-                  </p:tgtEl>
-                </p:cond>
-              </p:nextCondLst>
-            </p:seq>
-          </p:childTnLst>
-        </p:cTn>
-      </p:par>
-    </p:tnLst>
-  </p:timing>
 </p:sld>
 </file>
 
@@ -11556,7 +11197,7 @@
           <a:lstStyle/>
           <a:p>
             <a:r>
-              <a:rPr lang="en-US" dirty="0" err="1" smtClean="0"/>
+              <a:rPr lang="en-US" dirty="0" err="1"/>
               <a:t>RxJs</a:t>
             </a:r>
             <a:endParaRPr lang="en-US" dirty="0"/>
@@ -11579,29 +11220,29 @@
           <a:lstStyle/>
           <a:p>
             <a:r>
-              <a:rPr lang="en-US" dirty="0" smtClean="0"/>
+              <a:rPr lang="en-US" dirty="0"/>
               <a:t>Compose events and </a:t>
             </a:r>
             <a:r>
-              <a:rPr lang="en-US" dirty="0" err="1" smtClean="0"/>
+              <a:rPr lang="en-US" dirty="0" err="1"/>
               <a:t>async</a:t>
             </a:r>
             <a:r>
-              <a:rPr lang="en-US" dirty="0" smtClean="0"/>
+              <a:rPr lang="en-US" dirty="0"/>
               <a:t> data into </a:t>
             </a:r>
             <a:r>
-              <a:rPr lang="en-US" dirty="0" err="1" smtClean="0"/>
+              <a:rPr lang="en-US" dirty="0" err="1"/>
               <a:t>queryable</a:t>
             </a:r>
             <a:r>
-              <a:rPr lang="en-US" dirty="0" smtClean="0"/>
+              <a:rPr lang="en-US" dirty="0"/>
               <a:t> sequences</a:t>
             </a:r>
           </a:p>
           <a:p>
             <a:r>
-              <a:rPr lang="en-US" dirty="0" smtClean="0"/>
+              <a:rPr lang="en-US" dirty="0"/>
               <a:t>Many operators available operators</a:t>
             </a:r>
           </a:p>
@@ -11611,7 +11252,6 @@
               <a:rPr lang="en-US" dirty="0"/>
               <a:t>http://reactivex.io/documentation/operators.html</a:t>
             </a:r>
-            <a:endParaRPr lang="en-US" dirty="0" smtClean="0"/>
           </a:p>
         </p:txBody>
       </p:sp>
@@ -11812,10 +11452,9 @@
           <a:lstStyle/>
           <a:p>
             <a:r>
-              <a:rPr lang="en-US" dirty="0" smtClean="0"/>
+              <a:rPr lang="en-US" dirty="0"/>
               <a:t>Remember To Provide HTTP</a:t>
             </a:r>
-            <a:endParaRPr lang="en-US" dirty="0"/>
           </a:p>
         </p:txBody>
       </p:sp>
@@ -11835,18 +11474,18 @@
           <a:lstStyle/>
           <a:p>
             <a:r>
-              <a:rPr lang="en-US" dirty="0" smtClean="0"/>
+              <a:rPr lang="en-US" dirty="0"/>
               <a:t>Can do this at the root level</a:t>
             </a:r>
           </a:p>
           <a:p>
             <a:pPr lvl="1"/>
             <a:r>
-              <a:rPr lang="en-US" dirty="0" smtClean="0"/>
+              <a:rPr lang="en-US" dirty="0"/>
               <a:t>Sets up </a:t>
             </a:r>
             <a:r>
-              <a:rPr lang="en-US" dirty="0" err="1" smtClean="0"/>
+              <a:rPr lang="en-US" dirty="0" err="1"/>
               <a:t>XHRBackend</a:t>
             </a:r>
             <a:endParaRPr lang="en-US" dirty="0"/>
@@ -11890,13 +11529,6 @@
   <p:transition>
     <p:fade/>
   </p:transition>
-  <p:timing>
-    <p:tnLst>
-      <p:par>
-        <p:cTn id="1" dur="indefinite" restart="never" nodeType="tmRoot"/>
-      </p:par>
-    </p:tnLst>
-  </p:timing>
 </p:sld>
 </file>
 
@@ -11933,10 +11565,9 @@
           <a:lstStyle/>
           <a:p>
             <a:r>
-              <a:rPr lang="en-US" dirty="0" smtClean="0"/>
+              <a:rPr lang="en-US" dirty="0"/>
               <a:t>Working with Headers</a:t>
             </a:r>
-            <a:endParaRPr lang="en-US" dirty="0"/>
           </a:p>
         </p:txBody>
       </p:sp>
@@ -11956,10 +11587,9 @@
           <a:lstStyle/>
           <a:p>
             <a:r>
-              <a:rPr lang="en-US" dirty="0" smtClean="0"/>
+              <a:rPr lang="en-US" dirty="0"/>
               <a:t>Instantiate the Headers class</a:t>
             </a:r>
-            <a:endParaRPr lang="en-US" dirty="0"/>
           </a:p>
         </p:txBody>
       </p:sp>
@@ -12000,13 +11630,6 @@
   <p:transition>
     <p:fade/>
   </p:transition>
-  <p:timing>
-    <p:tnLst>
-      <p:par>
-        <p:cTn id="1" dur="indefinite" restart="never" nodeType="tmRoot"/>
-      </p:par>
-    </p:tnLst>
-  </p:timing>
 </p:sld>
 </file>
 
@@ -12043,10 +11666,9 @@
           <a:lstStyle/>
           <a:p>
             <a:r>
-              <a:rPr lang="en-US" dirty="0" smtClean="0"/>
+              <a:rPr lang="en-US" dirty="0"/>
               <a:t>Low Level Work</a:t>
             </a:r>
-            <a:endParaRPr lang="en-US" dirty="0"/>
           </a:p>
         </p:txBody>
       </p:sp>
@@ -12066,10 +11688,9 @@
           <a:lstStyle/>
           <a:p>
             <a:r>
-              <a:rPr lang="en-US" dirty="0" smtClean="0"/>
+              <a:rPr lang="en-US" dirty="0"/>
               <a:t>Use Request and Request options</a:t>
             </a:r>
-            <a:endParaRPr lang="en-US" dirty="0"/>
           </a:p>
         </p:txBody>
       </p:sp>
@@ -12110,13 +11731,6 @@
   <p:transition>
     <p:fade/>
   </p:transition>
-  <p:timing>
-    <p:tnLst>
-      <p:par>
-        <p:cTn id="1" dur="indefinite" restart="never" nodeType="tmRoot"/>
-      </p:par>
-    </p:tnLst>
-  </p:timing>
 </p:sld>
 </file>
 
@@ -12153,10 +11767,9 @@
           <a:lstStyle/>
           <a:p>
             <a:r>
-              <a:rPr lang="en-US" dirty="0" smtClean="0"/>
+              <a:rPr lang="en-US" dirty="0"/>
               <a:t>Summary</a:t>
             </a:r>
-            <a:endParaRPr lang="en-US" dirty="0"/>
           </a:p>
         </p:txBody>
       </p:sp>
@@ -12176,10 +11789,9 @@
           <a:lstStyle/>
           <a:p>
             <a:r>
-              <a:rPr lang="en-US" dirty="0" smtClean="0"/>
+              <a:rPr lang="en-US" dirty="0"/>
               <a:t>Injector -&gt; Provider -&gt; Service</a:t>
             </a:r>
-            <a:endParaRPr lang="en-US" dirty="0"/>
           </a:p>
         </p:txBody>
       </p:sp>
@@ -12218,13 +11830,6 @@
   <p:transition>
     <p:fade/>
   </p:transition>
-  <p:timing>
-    <p:tnLst>
-      <p:par>
-        <p:cTn id="1" dur="indefinite" restart="never" nodeType="tmRoot"/>
-      </p:par>
-    </p:tnLst>
-  </p:timing>
 </p:sld>
 </file>
 
@@ -12261,10 +11866,9 @@
           <a:lstStyle/>
           <a:p>
             <a:r>
-              <a:rPr lang="en-US" dirty="0" smtClean="0"/>
+              <a:rPr lang="en-US" dirty="0"/>
               <a:t>Inversion of Control</a:t>
             </a:r>
-            <a:endParaRPr lang="en-US" dirty="0"/>
           </a:p>
         </p:txBody>
       </p:sp>
@@ -12284,45 +11888,44 @@
           <a:lstStyle/>
           <a:p>
             <a:r>
-              <a:rPr lang="en-US" dirty="0" smtClean="0"/>
+              <a:rPr lang="en-US" dirty="0"/>
               <a:t>Increase modularity and extensibility</a:t>
             </a:r>
           </a:p>
           <a:p>
             <a:pPr lvl="1"/>
             <a:r>
-              <a:rPr lang="en-US" dirty="0" smtClean="0"/>
+              <a:rPr lang="en-US" dirty="0"/>
               <a:t>Factory pattern</a:t>
             </a:r>
           </a:p>
           <a:p>
             <a:pPr lvl="1"/>
             <a:r>
-              <a:rPr lang="en-US" dirty="0" smtClean="0"/>
+              <a:rPr lang="en-US" dirty="0"/>
               <a:t>Template method pattern</a:t>
             </a:r>
           </a:p>
           <a:p>
             <a:pPr lvl="1"/>
             <a:r>
-              <a:rPr lang="en-US" dirty="0" smtClean="0"/>
+              <a:rPr lang="en-US" dirty="0"/>
               <a:t>Strategy pattern</a:t>
             </a:r>
           </a:p>
           <a:p>
             <a:pPr lvl="1"/>
             <a:r>
-              <a:rPr lang="en-US" dirty="0" smtClean="0"/>
+              <a:rPr lang="en-US" dirty="0"/>
               <a:t>Service locator pattern</a:t>
             </a:r>
           </a:p>
           <a:p>
             <a:pPr lvl="1"/>
             <a:r>
-              <a:rPr lang="en-US" dirty="0" smtClean="0"/>
+              <a:rPr lang="en-US" dirty="0"/>
               <a:t>Dependency injection*</a:t>
             </a:r>
-            <a:endParaRPr lang="en-US" dirty="0"/>
           </a:p>
         </p:txBody>
       </p:sp>
@@ -12393,7 +11996,7 @@
               <a:t>"Template Method UML" by Giacomo </a:t>
             </a:r>
             <a:r>
-              <a:rPr lang="en-US" dirty="0" err="1" smtClean="0"/>
+              <a:rPr lang="en-US" dirty="0" err="1"/>
               <a:t>Ritucci</a:t>
             </a:r>
             <a:endParaRPr lang="en-US" dirty="0"/>
@@ -12803,10 +12406,9 @@
           <a:lstStyle/>
           <a:p>
             <a:r>
-              <a:rPr lang="en-US" dirty="0" smtClean="0"/>
+              <a:rPr lang="en-US" dirty="0"/>
               <a:t>Dependency Injection</a:t>
             </a:r>
-            <a:endParaRPr lang="en-US" dirty="0"/>
           </a:p>
         </p:txBody>
       </p:sp>
@@ -12826,10 +12428,9 @@
           <a:lstStyle/>
           <a:p>
             <a:r>
-              <a:rPr lang="en-US" dirty="0" smtClean="0"/>
+              <a:rPr lang="en-US" dirty="0"/>
               <a:t>Object asks for dependencies instead of creating them</a:t>
             </a:r>
-            <a:endParaRPr lang="en-US" dirty="0"/>
           </a:p>
         </p:txBody>
       </p:sp>
@@ -13066,11 +12667,11 @@
           <a:lstStyle/>
           <a:p>
             <a:r>
-              <a:rPr lang="en-US" dirty="0" smtClean="0"/>
+              <a:rPr lang="en-US" dirty="0"/>
               <a:t>DI and </a:t>
             </a:r>
             <a:r>
-              <a:rPr lang="en-US" dirty="0" err="1" smtClean="0"/>
+              <a:rPr lang="en-US" dirty="0" err="1"/>
               <a:t>IoC</a:t>
             </a:r>
             <a:endParaRPr lang="en-US" dirty="0"/>
@@ -13093,32 +12694,31 @@
           <a:lstStyle/>
           <a:p>
             <a:r>
-              <a:rPr lang="en-US" dirty="0" smtClean="0"/>
+              <a:rPr lang="en-US" dirty="0"/>
               <a:t>Dependency injection enabled by </a:t>
             </a:r>
             <a:r>
-              <a:rPr lang="en-US" dirty="0" err="1" smtClean="0"/>
+              <a:rPr lang="en-US" dirty="0" err="1"/>
               <a:t>IoC</a:t>
             </a:r>
             <a:r>
-              <a:rPr lang="en-US" dirty="0" smtClean="0"/>
+              <a:rPr lang="en-US" dirty="0"/>
               <a:t> container</a:t>
             </a:r>
           </a:p>
           <a:p>
             <a:pPr lvl="1"/>
             <a:r>
-              <a:rPr lang="en-US" dirty="0" smtClean="0"/>
+              <a:rPr lang="en-US" dirty="0"/>
               <a:t>Container knows how to build and assemble objects</a:t>
             </a:r>
           </a:p>
           <a:p>
             <a:pPr lvl="1"/>
             <a:r>
-              <a:rPr lang="en-US" dirty="0" smtClean="0"/>
+              <a:rPr lang="en-US" dirty="0"/>
               <a:t>Container knows how to analyze dependencies</a:t>
             </a:r>
-            <a:endParaRPr lang="en-US" dirty="0"/>
           </a:p>
         </p:txBody>
       </p:sp>
@@ -13165,14 +12765,11 @@
           <a:p>
             <a:pPr algn="ctr"/>
             <a:r>
-              <a:rPr lang="en-US" sz="2000" dirty="0" smtClean="0">
+              <a:rPr lang="en-US" sz="2000" dirty="0">
                 <a:latin typeface="Tekton Pro" pitchFamily="34" charset="0"/>
               </a:rPr>
               <a:t>Container</a:t>
             </a:r>
-            <a:endParaRPr lang="en-US" sz="2000" dirty="0">
-              <a:latin typeface="Tekton Pro" pitchFamily="34" charset="0"/>
-            </a:endParaRPr>
           </a:p>
         </p:txBody>
       </p:sp>
@@ -13217,14 +12814,11 @@
           <a:p>
             <a:pPr algn="ctr"/>
             <a:r>
-              <a:rPr lang="en-US" sz="2000" dirty="0" smtClean="0">
+              <a:rPr lang="en-US" sz="2000" dirty="0">
                 <a:latin typeface="Tekton Pro" pitchFamily="34" charset="0"/>
               </a:rPr>
               <a:t>Http</a:t>
             </a:r>
-            <a:endParaRPr lang="en-US" sz="2000" dirty="0">
-              <a:latin typeface="Tekton Pro" pitchFamily="34" charset="0"/>
-            </a:endParaRPr>
           </a:p>
         </p:txBody>
       </p:sp>
@@ -13269,7 +12863,7 @@
           <a:p>
             <a:pPr algn="ctr"/>
             <a:r>
-              <a:rPr lang="en-US" sz="2000" dirty="0" err="1" smtClean="0">
+              <a:rPr lang="en-US" sz="2000" dirty="0" err="1">
                 <a:latin typeface="Tekton Pro" pitchFamily="34" charset="0"/>
               </a:rPr>
               <a:t>HttpBackend</a:t>
@@ -13321,7 +12915,7 @@
           <a:p>
             <a:pPr algn="ctr"/>
             <a:r>
-              <a:rPr lang="en-US" sz="2000" dirty="0" err="1" smtClean="0">
+              <a:rPr lang="en-US" sz="2000" dirty="0" err="1">
                 <a:latin typeface="Tekton Pro" pitchFamily="34" charset="0"/>
               </a:rPr>
               <a:t>RequestOptions</a:t>
@@ -13557,14 +13151,11 @@
           <a:p>
             <a:pPr algn="ctr"/>
             <a:r>
-              <a:rPr lang="en-US" sz="2000" dirty="0" smtClean="0">
+              <a:rPr lang="en-US" sz="2000" dirty="0">
                 <a:latin typeface="Tekton Pro" pitchFamily="34" charset="0"/>
               </a:rPr>
               <a:t>Component</a:t>
             </a:r>
-            <a:endParaRPr lang="en-US" sz="2000" dirty="0">
-              <a:latin typeface="Tekton Pro" pitchFamily="34" charset="0"/>
-            </a:endParaRPr>
           </a:p>
         </p:txBody>
       </p:sp>
@@ -14089,10 +13680,9 @@
           <a:lstStyle/>
           <a:p>
             <a:r>
-              <a:rPr lang="en-US" dirty="0" smtClean="0"/>
+              <a:rPr lang="en-US" dirty="0"/>
               <a:t>The Angular Injector</a:t>
             </a:r>
-            <a:endParaRPr lang="en-US" dirty="0"/>
           </a:p>
         </p:txBody>
       </p:sp>
@@ -14112,24 +13702,23 @@
           <a:lstStyle/>
           <a:p>
             <a:r>
-              <a:rPr lang="en-US" dirty="0" smtClean="0"/>
+              <a:rPr lang="en-US" dirty="0"/>
               <a:t>The injector is available after bootstrapping</a:t>
             </a:r>
           </a:p>
           <a:p>
             <a:pPr lvl="1"/>
             <a:r>
-              <a:rPr lang="en-US" dirty="0" smtClean="0"/>
+              <a:rPr lang="en-US" dirty="0"/>
               <a:t>Many core services come pre-configured</a:t>
             </a:r>
           </a:p>
           <a:p>
             <a:pPr lvl="1"/>
             <a:r>
-              <a:rPr lang="en-US" dirty="0" smtClean="0"/>
+              <a:rPr lang="en-US" dirty="0"/>
               <a:t>Need to register custom services</a:t>
             </a:r>
-            <a:endParaRPr lang="en-US" dirty="0"/>
           </a:p>
         </p:txBody>
       </p:sp>
@@ -14170,13 +13759,6 @@
   <p:transition>
     <p:fade/>
   </p:transition>
-  <p:timing>
-    <p:tnLst>
-      <p:par>
-        <p:cTn id="1" dur="indefinite" restart="never" nodeType="tmRoot"/>
-      </p:par>
-    </p:tnLst>
-  </p:timing>
 </p:sld>
 </file>
 
@@ -14213,10 +13795,9 @@
           <a:lstStyle/>
           <a:p>
             <a:r>
-              <a:rPr lang="en-US" dirty="0" smtClean="0"/>
+              <a:rPr lang="en-US" dirty="0"/>
               <a:t>Providers</a:t>
             </a:r>
-            <a:endParaRPr lang="en-US" dirty="0"/>
           </a:p>
         </p:txBody>
       </p:sp>
@@ -14236,40 +13817,40 @@
           <a:lstStyle/>
           <a:p>
             <a:r>
-              <a:rPr lang="en-US" dirty="0" smtClean="0"/>
+              <a:rPr lang="en-US" dirty="0"/>
               <a:t>The injector requires a provider for every service</a:t>
             </a:r>
           </a:p>
           <a:p>
             <a:pPr lvl="1"/>
             <a:r>
-              <a:rPr lang="en-US" dirty="0" smtClean="0"/>
+              <a:rPr lang="en-US" dirty="0"/>
               <a:t>Can use built-in providers that rely on class definitions</a:t>
             </a:r>
           </a:p>
           <a:p>
             <a:r>
-              <a:rPr lang="en-US" dirty="0" smtClean="0"/>
+              <a:rPr lang="en-US" dirty="0"/>
               <a:t>Providers registered at the component level</a:t>
             </a:r>
           </a:p>
           <a:p>
             <a:pPr lvl="1"/>
             <a:r>
-              <a:rPr lang="en-US" dirty="0" smtClean="0"/>
+              <a:rPr lang="en-US" dirty="0"/>
               <a:t>Components can register unique providers for children</a:t>
             </a:r>
           </a:p>
           <a:p>
             <a:r>
-              <a:rPr lang="en-US" dirty="0" smtClean="0"/>
+              <a:rPr lang="en-US" dirty="0"/>
               <a:t>Injector uses provider only once</a:t>
             </a:r>
           </a:p>
           <a:p>
             <a:pPr lvl="1"/>
             <a:r>
-              <a:rPr lang="en-US" dirty="0" smtClean="0"/>
+              <a:rPr lang="en-US" dirty="0"/>
               <a:t>Single instance</a:t>
             </a:r>
           </a:p>
@@ -14315,13 +13896,6 @@
   <p:transition>
     <p:fade/>
   </p:transition>
-  <p:timing>
-    <p:tnLst>
-      <p:par>
-        <p:cTn id="1" dur="indefinite" restart="never" nodeType="tmRoot"/>
-      </p:par>
-    </p:tnLst>
-  </p:timing>
 </p:sld>
 </file>
 
@@ -14358,10 +13932,9 @@
           <a:lstStyle/>
           <a:p>
             <a:r>
-              <a:rPr lang="en-US" dirty="0" smtClean="0"/>
+              <a:rPr lang="en-US" dirty="0"/>
               <a:t>Metadata</a:t>
             </a:r>
-            <a:endParaRPr lang="en-US" dirty="0"/>
           </a:p>
         </p:txBody>
       </p:sp>
@@ -14381,7 +13954,7 @@
           <a:lstStyle/>
           <a:p>
             <a:r>
-              <a:rPr lang="en-US" dirty="0" smtClean="0"/>
+              <a:rPr lang="en-US" dirty="0"/>
               <a:t>Injector relies on metadata to analyze dependencies</a:t>
             </a:r>
           </a:p>
@@ -14428,13 +14001,6 @@
   <p:transition>
     <p:fade/>
   </p:transition>
-  <p:timing>
-    <p:tnLst>
-      <p:par>
-        <p:cTn id="1" dur="indefinite" restart="never" nodeType="tmRoot"/>
-      </p:par>
-    </p:tnLst>
-  </p:timing>
 </p:sld>
 </file>
 
@@ -14471,10 +14037,9 @@
           <a:lstStyle/>
           <a:p>
             <a:r>
-              <a:rPr lang="en-US" dirty="0" smtClean="0"/>
+              <a:rPr lang="en-US" dirty="0"/>
               <a:t>Decorators</a:t>
             </a:r>
-            <a:endParaRPr lang="en-US" dirty="0"/>
           </a:p>
         </p:txBody>
       </p:sp>
@@ -14494,31 +14059,30 @@
           <a:lstStyle/>
           <a:p>
             <a:r>
-              <a:rPr lang="en-US" dirty="0" smtClean="0"/>
+              <a:rPr lang="en-US" dirty="0"/>
               <a:t>Only decorators can add the metadata required for injection</a:t>
             </a:r>
           </a:p>
           <a:p>
             <a:pPr lvl="1"/>
             <a:r>
-              <a:rPr lang="en-US" dirty="0" smtClean="0"/>
+              <a:rPr lang="en-US" dirty="0"/>
               <a:t>@Component </a:t>
             </a:r>
           </a:p>
           <a:p>
             <a:pPr lvl="1"/>
             <a:r>
-              <a:rPr lang="en-US" dirty="0" smtClean="0"/>
+              <a:rPr lang="en-US" dirty="0"/>
               <a:t>@Injectable</a:t>
             </a:r>
           </a:p>
           <a:p>
             <a:pPr lvl="1"/>
             <a:r>
-              <a:rPr lang="en-US" dirty="0" smtClean="0"/>
+              <a:rPr lang="en-US" dirty="0"/>
               <a:t>Any other decorator you might need on a service</a:t>
             </a:r>
-            <a:endParaRPr lang="en-US" dirty="0"/>
           </a:p>
         </p:txBody>
       </p:sp>
@@ -14559,13 +14123,6 @@
   <p:transition>
     <p:fade/>
   </p:transition>
-  <p:timing>
-    <p:tnLst>
-      <p:par>
-        <p:cTn id="1" dur="indefinite" restart="never" nodeType="tmRoot"/>
-      </p:par>
-    </p:tnLst>
-  </p:timing>
 </p:sld>
 </file>
 
@@ -14602,10 +14159,9 @@
           <a:lstStyle/>
           <a:p>
             <a:r>
-              <a:rPr lang="en-US" dirty="0" smtClean="0"/>
+              <a:rPr lang="en-US" dirty="0"/>
               <a:t>Providers Revisited</a:t>
             </a:r>
-            <a:endParaRPr lang="en-US" dirty="0"/>
           </a:p>
         </p:txBody>
       </p:sp>
@@ -14625,30 +14181,30 @@
           <a:lstStyle/>
           <a:p>
             <a:r>
-              <a:rPr lang="en-US" dirty="0" smtClean="0"/>
+              <a:rPr lang="en-US" dirty="0"/>
               <a:t>Different techniques for registering providers</a:t>
             </a:r>
           </a:p>
           <a:p>
             <a:pPr lvl="1"/>
             <a:r>
-              <a:rPr lang="en-US" dirty="0" err="1" smtClean="0"/>
+              <a:rPr lang="en-US" dirty="0" err="1"/>
               <a:t>useClass</a:t>
             </a:r>
-            <a:endParaRPr lang="en-US" dirty="0" smtClean="0"/>
+            <a:endParaRPr lang="en-US" dirty="0"/>
           </a:p>
           <a:p>
             <a:pPr lvl="1"/>
             <a:r>
-              <a:rPr lang="en-US" dirty="0" err="1" smtClean="0"/>
+              <a:rPr lang="en-US" dirty="0" err="1"/>
               <a:t>useFactory</a:t>
             </a:r>
-            <a:endParaRPr lang="en-US" dirty="0" smtClean="0"/>
+            <a:endParaRPr lang="en-US" dirty="0"/>
           </a:p>
           <a:p>
             <a:pPr lvl="1"/>
             <a:r>
-              <a:rPr lang="en-US" dirty="0" err="1" smtClean="0"/>
+              <a:rPr lang="en-US" dirty="0" err="1"/>
               <a:t>useValue</a:t>
             </a:r>
             <a:endParaRPr lang="en-US" dirty="0"/>

</xml_diff>